<commit_message>
Updated pptx with dropout figure
</commit_message>
<xml_diff>
--- a/Lesson2/Figures/Lesson2Figures.pptx
+++ b/Lesson2/Figures/Lesson2Figures.pptx
@@ -5,12 +5,13 @@
     <p:sldMasterId id="2147483648" r:id="rId1"/>
   </p:sldMasterIdLst>
   <p:notesMasterIdLst>
-    <p:notesMasterId r:id="rId5"/>
+    <p:notesMasterId r:id="rId6"/>
   </p:notesMasterIdLst>
   <p:sldIdLst>
     <p:sldId id="256" r:id="rId2"/>
     <p:sldId id="258" r:id="rId3"/>
-    <p:sldId id="257" r:id="rId4"/>
+    <p:sldId id="259" r:id="rId4"/>
+    <p:sldId id="257" r:id="rId5"/>
   </p:sldIdLst>
   <p:sldSz cx="12192000" cy="6858000"/>
   <p:notesSz cx="6858000" cy="9144000"/>
@@ -531,7 +532,7 @@
           <a:p>
             <a:fld id="{B621EE03-67A8-4613-ABD7-D4E04D1422EC}" type="slidenum">
               <a:rPr lang="en-US" smtClean="0"/>
-              <a:t>3</a:t>
+              <a:t>4</a:t>
             </a:fld>
             <a:endParaRPr lang="en-US"/>
           </a:p>
@@ -9908,6 +9909,4653 @@
 </file>
 
 <file path=ppt/slides/slide3.xml><?xml version="1.0" encoding="utf-8"?>
+<p:sld xmlns:a="http://schemas.openxmlformats.org/drawingml/2006/main" xmlns:r="http://schemas.openxmlformats.org/officeDocument/2006/relationships" xmlns:p="http://schemas.openxmlformats.org/presentationml/2006/main">
+  <p:cSld>
+    <p:spTree>
+      <p:nvGrpSpPr>
+        <p:cNvPr id="1" name=""/>
+        <p:cNvGrpSpPr/>
+        <p:nvPr/>
+      </p:nvGrpSpPr>
+      <p:grpSpPr>
+        <a:xfrm>
+          <a:off x="0" y="0"/>
+          <a:ext cx="0" cy="0"/>
+          <a:chOff x="0" y="0"/>
+          <a:chExt cx="0" cy="0"/>
+        </a:xfrm>
+      </p:grpSpPr>
+      <p:sp>
+        <p:nvSpPr>
+          <p:cNvPr id="2" name="Oval 1">
+            <a:extLst>
+              <a:ext uri="{FF2B5EF4-FFF2-40B4-BE49-F238E27FC236}">
+                <a16:creationId xmlns:a16="http://schemas.microsoft.com/office/drawing/2014/main" id="{51FE4011-46BA-47CA-A872-555D16AE6657}"/>
+              </a:ext>
+            </a:extLst>
+          </p:cNvPr>
+          <p:cNvSpPr/>
+          <p:nvPr/>
+        </p:nvSpPr>
+        <p:spPr>
+          <a:xfrm>
+            <a:off x="3999308" y="2727007"/>
+            <a:ext cx="460559" cy="414338"/>
+          </a:xfrm>
+          <a:prstGeom prst="ellipse">
+            <a:avLst/>
+          </a:prstGeom>
+          <a:noFill/>
+        </p:spPr>
+        <p:style>
+          <a:lnRef idx="2">
+            <a:schemeClr val="accent1">
+              <a:shade val="50000"/>
+            </a:schemeClr>
+          </a:lnRef>
+          <a:fillRef idx="1">
+            <a:schemeClr val="accent1"/>
+          </a:fillRef>
+          <a:effectRef idx="0">
+            <a:schemeClr val="accent1"/>
+          </a:effectRef>
+          <a:fontRef idx="minor">
+            <a:schemeClr val="lt1"/>
+          </a:fontRef>
+        </p:style>
+        <p:txBody>
+          <a:bodyPr rtlCol="0" anchor="ctr"/>
+          <a:lstStyle/>
+          <a:p>
+            <a:pPr algn="ctr"/>
+            <a:r>
+              <a:rPr lang="en-US" dirty="0">
+                <a:solidFill>
+                  <a:schemeClr val="tx1"/>
+                </a:solidFill>
+              </a:rPr>
+              <a:t>O</a:t>
+            </a:r>
+          </a:p>
+        </p:txBody>
+      </p:sp>
+      <p:sp>
+        <p:nvSpPr>
+          <p:cNvPr id="8" name="Oval 7">
+            <a:extLst>
+              <a:ext uri="{FF2B5EF4-FFF2-40B4-BE49-F238E27FC236}">
+                <a16:creationId xmlns:a16="http://schemas.microsoft.com/office/drawing/2014/main" id="{DE69160F-501E-4BFA-B3B1-E21995E82251}"/>
+              </a:ext>
+            </a:extLst>
+          </p:cNvPr>
+          <p:cNvSpPr/>
+          <p:nvPr/>
+        </p:nvSpPr>
+        <p:spPr>
+          <a:xfrm>
+            <a:off x="3641052" y="3231512"/>
+            <a:ext cx="547688" cy="485775"/>
+          </a:xfrm>
+          <a:prstGeom prst="ellipse">
+            <a:avLst/>
+          </a:prstGeom>
+          <a:noFill/>
+        </p:spPr>
+        <p:style>
+          <a:lnRef idx="2">
+            <a:schemeClr val="accent1">
+              <a:shade val="50000"/>
+            </a:schemeClr>
+          </a:lnRef>
+          <a:fillRef idx="1">
+            <a:schemeClr val="accent1"/>
+          </a:fillRef>
+          <a:effectRef idx="0">
+            <a:schemeClr val="accent1"/>
+          </a:effectRef>
+          <a:fontRef idx="minor">
+            <a:schemeClr val="lt1"/>
+          </a:fontRef>
+        </p:style>
+        <p:txBody>
+          <a:bodyPr rtlCol="0" anchor="ctr"/>
+          <a:lstStyle/>
+          <a:p>
+            <a:pPr algn="ctr"/>
+            <a:r>
+              <a:rPr lang="en-US" dirty="0">
+                <a:solidFill>
+                  <a:schemeClr val="tx1"/>
+                </a:solidFill>
+              </a:rPr>
+              <a:t>h</a:t>
+            </a:r>
+            <a:r>
+              <a:rPr lang="en-US" baseline="-25000" dirty="0">
+                <a:solidFill>
+                  <a:schemeClr val="tx1"/>
+                </a:solidFill>
+              </a:rPr>
+              <a:t>2</a:t>
+            </a:r>
+          </a:p>
+        </p:txBody>
+      </p:sp>
+      <p:sp>
+        <p:nvSpPr>
+          <p:cNvPr id="9" name="Oval 8">
+            <a:extLst>
+              <a:ext uri="{FF2B5EF4-FFF2-40B4-BE49-F238E27FC236}">
+                <a16:creationId xmlns:a16="http://schemas.microsoft.com/office/drawing/2014/main" id="{ABB95ABA-1402-455C-8827-1CB2C70A81E6}"/>
+              </a:ext>
+            </a:extLst>
+          </p:cNvPr>
+          <p:cNvSpPr/>
+          <p:nvPr/>
+        </p:nvSpPr>
+        <p:spPr>
+          <a:xfrm>
+            <a:off x="3531827" y="3860482"/>
+            <a:ext cx="547688" cy="485775"/>
+          </a:xfrm>
+          <a:prstGeom prst="ellipse">
+            <a:avLst/>
+          </a:prstGeom>
+          <a:noFill/>
+        </p:spPr>
+        <p:style>
+          <a:lnRef idx="2">
+            <a:schemeClr val="accent1">
+              <a:shade val="50000"/>
+            </a:schemeClr>
+          </a:lnRef>
+          <a:fillRef idx="1">
+            <a:schemeClr val="accent1"/>
+          </a:fillRef>
+          <a:effectRef idx="0">
+            <a:schemeClr val="accent1"/>
+          </a:effectRef>
+          <a:fontRef idx="minor">
+            <a:schemeClr val="lt1"/>
+          </a:fontRef>
+        </p:style>
+        <p:txBody>
+          <a:bodyPr rtlCol="0" anchor="ctr"/>
+          <a:lstStyle/>
+          <a:p>
+            <a:pPr algn="ctr"/>
+            <a:r>
+              <a:rPr lang="en-US" dirty="0">
+                <a:solidFill>
+                  <a:schemeClr val="tx1"/>
+                </a:solidFill>
+              </a:rPr>
+              <a:t>i</a:t>
+            </a:r>
+            <a:r>
+              <a:rPr lang="en-US" baseline="-25000" dirty="0">
+                <a:solidFill>
+                  <a:schemeClr val="tx1"/>
+                </a:solidFill>
+              </a:rPr>
+              <a:t>1</a:t>
+            </a:r>
+          </a:p>
+        </p:txBody>
+      </p:sp>
+      <p:sp>
+        <p:nvSpPr>
+          <p:cNvPr id="10" name="Oval 9">
+            <a:extLst>
+              <a:ext uri="{FF2B5EF4-FFF2-40B4-BE49-F238E27FC236}">
+                <a16:creationId xmlns:a16="http://schemas.microsoft.com/office/drawing/2014/main" id="{2194A9E5-9BCC-4544-8FE1-CB855BC55180}"/>
+              </a:ext>
+            </a:extLst>
+          </p:cNvPr>
+          <p:cNvSpPr/>
+          <p:nvPr/>
+        </p:nvSpPr>
+        <p:spPr>
+          <a:xfrm>
+            <a:off x="4381033" y="3860482"/>
+            <a:ext cx="547688" cy="485775"/>
+          </a:xfrm>
+          <a:prstGeom prst="ellipse">
+            <a:avLst/>
+          </a:prstGeom>
+          <a:noFill/>
+        </p:spPr>
+        <p:style>
+          <a:lnRef idx="2">
+            <a:schemeClr val="accent1">
+              <a:shade val="50000"/>
+            </a:schemeClr>
+          </a:lnRef>
+          <a:fillRef idx="1">
+            <a:schemeClr val="accent1"/>
+          </a:fillRef>
+          <a:effectRef idx="0">
+            <a:schemeClr val="accent1"/>
+          </a:effectRef>
+          <a:fontRef idx="minor">
+            <a:schemeClr val="lt1"/>
+          </a:fontRef>
+        </p:style>
+        <p:txBody>
+          <a:bodyPr rtlCol="0" anchor="ctr"/>
+          <a:lstStyle/>
+          <a:p>
+            <a:pPr algn="ctr"/>
+            <a:r>
+              <a:rPr lang="en-US" dirty="0">
+                <a:solidFill>
+                  <a:schemeClr val="tx1"/>
+                </a:solidFill>
+              </a:rPr>
+              <a:t>i</a:t>
+            </a:r>
+            <a:r>
+              <a:rPr lang="en-US" baseline="-25000" dirty="0">
+                <a:solidFill>
+                  <a:schemeClr val="tx1"/>
+                </a:solidFill>
+              </a:rPr>
+              <a:t>2</a:t>
+            </a:r>
+          </a:p>
+        </p:txBody>
+      </p:sp>
+      <p:cxnSp>
+        <p:nvCxnSpPr>
+          <p:cNvPr id="14" name="Straight Arrow Connector 13">
+            <a:extLst>
+              <a:ext uri="{FF2B5EF4-FFF2-40B4-BE49-F238E27FC236}">
+                <a16:creationId xmlns:a16="http://schemas.microsoft.com/office/drawing/2014/main" id="{6F4F451E-3AF6-48F0-804D-AAA986227953}"/>
+              </a:ext>
+            </a:extLst>
+          </p:cNvPr>
+          <p:cNvCxnSpPr>
+            <a:cxnSpLocks/>
+            <a:stCxn id="8" idx="1"/>
+            <a:endCxn id="2" idx="3"/>
+          </p:cNvCxnSpPr>
+          <p:nvPr/>
+        </p:nvCxnSpPr>
+        <p:spPr>
+          <a:xfrm flipV="1">
+            <a:off x="3721259" y="3080667"/>
+            <a:ext cx="345496" cy="221985"/>
+          </a:xfrm>
+          <a:prstGeom prst="straightConnector1">
+            <a:avLst/>
+          </a:prstGeom>
+          <a:ln w="19050">
+            <a:solidFill>
+              <a:schemeClr val="accent1"/>
+            </a:solidFill>
+            <a:tailEnd type="triangle"/>
+          </a:ln>
+        </p:spPr>
+        <p:style>
+          <a:lnRef idx="1">
+            <a:schemeClr val="accent1"/>
+          </a:lnRef>
+          <a:fillRef idx="0">
+            <a:schemeClr val="accent1"/>
+          </a:fillRef>
+          <a:effectRef idx="0">
+            <a:schemeClr val="accent1"/>
+          </a:effectRef>
+          <a:fontRef idx="minor">
+            <a:schemeClr val="tx1"/>
+          </a:fontRef>
+        </p:style>
+      </p:cxnSp>
+      <p:cxnSp>
+        <p:nvCxnSpPr>
+          <p:cNvPr id="24" name="Straight Arrow Connector 23">
+            <a:extLst>
+              <a:ext uri="{FF2B5EF4-FFF2-40B4-BE49-F238E27FC236}">
+                <a16:creationId xmlns:a16="http://schemas.microsoft.com/office/drawing/2014/main" id="{ACA82187-44EE-4EDE-BAE6-5FFE16D65B1C}"/>
+              </a:ext>
+            </a:extLst>
+          </p:cNvPr>
+          <p:cNvCxnSpPr>
+            <a:cxnSpLocks/>
+            <a:stCxn id="10" idx="0"/>
+            <a:endCxn id="8" idx="4"/>
+          </p:cNvCxnSpPr>
+          <p:nvPr/>
+        </p:nvCxnSpPr>
+        <p:spPr>
+          <a:xfrm flipH="1" flipV="1">
+            <a:off x="3914896" y="3717287"/>
+            <a:ext cx="739981" cy="143195"/>
+          </a:xfrm>
+          <a:prstGeom prst="straightConnector1">
+            <a:avLst/>
+          </a:prstGeom>
+          <a:ln w="19050">
+            <a:solidFill>
+              <a:schemeClr val="accent1"/>
+            </a:solidFill>
+            <a:tailEnd type="triangle"/>
+          </a:ln>
+        </p:spPr>
+        <p:style>
+          <a:lnRef idx="1">
+            <a:schemeClr val="accent1"/>
+          </a:lnRef>
+          <a:fillRef idx="0">
+            <a:schemeClr val="accent1"/>
+          </a:fillRef>
+          <a:effectRef idx="0">
+            <a:schemeClr val="accent1"/>
+          </a:effectRef>
+          <a:fontRef idx="minor">
+            <a:schemeClr val="tx1"/>
+          </a:fontRef>
+        </p:style>
+      </p:cxnSp>
+      <p:cxnSp>
+        <p:nvCxnSpPr>
+          <p:cNvPr id="30" name="Straight Arrow Connector 29">
+            <a:extLst>
+              <a:ext uri="{FF2B5EF4-FFF2-40B4-BE49-F238E27FC236}">
+                <a16:creationId xmlns:a16="http://schemas.microsoft.com/office/drawing/2014/main" id="{50C9BB14-5617-4832-BC39-C300F9A8C5B2}"/>
+              </a:ext>
+            </a:extLst>
+          </p:cNvPr>
+          <p:cNvCxnSpPr>
+            <a:cxnSpLocks/>
+            <a:endCxn id="8" idx="3"/>
+          </p:cNvCxnSpPr>
+          <p:nvPr/>
+        </p:nvCxnSpPr>
+        <p:spPr>
+          <a:xfrm flipH="1" flipV="1">
+            <a:off x="3721259" y="3646147"/>
+            <a:ext cx="230966" cy="275928"/>
+          </a:xfrm>
+          <a:prstGeom prst="straightConnector1">
+            <a:avLst/>
+          </a:prstGeom>
+          <a:ln w="19050">
+            <a:solidFill>
+              <a:schemeClr val="accent1"/>
+            </a:solidFill>
+            <a:tailEnd type="triangle"/>
+          </a:ln>
+        </p:spPr>
+        <p:style>
+          <a:lnRef idx="1">
+            <a:schemeClr val="accent1"/>
+          </a:lnRef>
+          <a:fillRef idx="0">
+            <a:schemeClr val="accent1"/>
+          </a:fillRef>
+          <a:effectRef idx="0">
+            <a:schemeClr val="accent1"/>
+          </a:effectRef>
+          <a:fontRef idx="minor">
+            <a:schemeClr val="tx1"/>
+          </a:fontRef>
+        </p:style>
+      </p:cxnSp>
+      <p:sp>
+        <p:nvSpPr>
+          <p:cNvPr id="37" name="Oval 36">
+            <a:extLst>
+              <a:ext uri="{FF2B5EF4-FFF2-40B4-BE49-F238E27FC236}">
+                <a16:creationId xmlns:a16="http://schemas.microsoft.com/office/drawing/2014/main" id="{BA8748F5-228E-4FCE-ACB9-75D67B69F5BB}"/>
+              </a:ext>
+            </a:extLst>
+          </p:cNvPr>
+          <p:cNvSpPr/>
+          <p:nvPr/>
+        </p:nvSpPr>
+        <p:spPr>
+          <a:xfrm>
+            <a:off x="4295248" y="3213399"/>
+            <a:ext cx="547688" cy="485775"/>
+          </a:xfrm>
+          <a:prstGeom prst="ellipse">
+            <a:avLst/>
+          </a:prstGeom>
+          <a:noFill/>
+        </p:spPr>
+        <p:style>
+          <a:lnRef idx="2">
+            <a:schemeClr val="accent1">
+              <a:shade val="50000"/>
+            </a:schemeClr>
+          </a:lnRef>
+          <a:fillRef idx="1">
+            <a:schemeClr val="accent1"/>
+          </a:fillRef>
+          <a:effectRef idx="0">
+            <a:schemeClr val="accent1"/>
+          </a:effectRef>
+          <a:fontRef idx="minor">
+            <a:schemeClr val="lt1"/>
+          </a:fontRef>
+        </p:style>
+        <p:txBody>
+          <a:bodyPr rtlCol="0" anchor="ctr"/>
+          <a:lstStyle/>
+          <a:p>
+            <a:pPr algn="ctr"/>
+            <a:r>
+              <a:rPr lang="en-US" dirty="0">
+                <a:solidFill>
+                  <a:schemeClr val="tx1"/>
+                </a:solidFill>
+              </a:rPr>
+              <a:t>h</a:t>
+            </a:r>
+            <a:r>
+              <a:rPr lang="en-US" baseline="-25000" dirty="0">
+                <a:solidFill>
+                  <a:schemeClr val="tx1"/>
+                </a:solidFill>
+              </a:rPr>
+              <a:t>3</a:t>
+            </a:r>
+          </a:p>
+        </p:txBody>
+      </p:sp>
+      <p:sp>
+        <p:nvSpPr>
+          <p:cNvPr id="38" name="Oval 37">
+            <a:extLst>
+              <a:ext uri="{FF2B5EF4-FFF2-40B4-BE49-F238E27FC236}">
+                <a16:creationId xmlns:a16="http://schemas.microsoft.com/office/drawing/2014/main" id="{BD5ADA9B-5052-4E8A-BA62-BB64AB33674F}"/>
+              </a:ext>
+            </a:extLst>
+          </p:cNvPr>
+          <p:cNvSpPr/>
+          <p:nvPr/>
+        </p:nvSpPr>
+        <p:spPr>
+          <a:xfrm>
+            <a:off x="4949444" y="3245501"/>
+            <a:ext cx="547688" cy="485775"/>
+          </a:xfrm>
+          <a:prstGeom prst="ellipse">
+            <a:avLst/>
+          </a:prstGeom>
+          <a:noFill/>
+        </p:spPr>
+        <p:style>
+          <a:lnRef idx="2">
+            <a:schemeClr val="accent1">
+              <a:shade val="50000"/>
+            </a:schemeClr>
+          </a:lnRef>
+          <a:fillRef idx="1">
+            <a:schemeClr val="accent1"/>
+          </a:fillRef>
+          <a:effectRef idx="0">
+            <a:schemeClr val="accent1"/>
+          </a:effectRef>
+          <a:fontRef idx="minor">
+            <a:schemeClr val="lt1"/>
+          </a:fontRef>
+        </p:style>
+        <p:txBody>
+          <a:bodyPr rtlCol="0" anchor="ctr"/>
+          <a:lstStyle/>
+          <a:p>
+            <a:pPr algn="ctr"/>
+            <a:r>
+              <a:rPr lang="en-US" dirty="0">
+                <a:solidFill>
+                  <a:schemeClr val="tx1"/>
+                </a:solidFill>
+              </a:rPr>
+              <a:t>h</a:t>
+            </a:r>
+            <a:r>
+              <a:rPr lang="en-US" baseline="-25000" dirty="0">
+                <a:solidFill>
+                  <a:schemeClr val="tx1"/>
+                </a:solidFill>
+              </a:rPr>
+              <a:t>4</a:t>
+            </a:r>
+          </a:p>
+        </p:txBody>
+      </p:sp>
+      <p:cxnSp>
+        <p:nvCxnSpPr>
+          <p:cNvPr id="39" name="Straight Arrow Connector 38">
+            <a:extLst>
+              <a:ext uri="{FF2B5EF4-FFF2-40B4-BE49-F238E27FC236}">
+                <a16:creationId xmlns:a16="http://schemas.microsoft.com/office/drawing/2014/main" id="{F3BA5500-8101-41BA-AA03-D6C0A8A9EC98}"/>
+              </a:ext>
+            </a:extLst>
+          </p:cNvPr>
+          <p:cNvCxnSpPr>
+            <a:cxnSpLocks/>
+            <a:stCxn id="37" idx="0"/>
+            <a:endCxn id="2" idx="5"/>
+          </p:cNvCxnSpPr>
+          <p:nvPr/>
+        </p:nvCxnSpPr>
+        <p:spPr>
+          <a:xfrm flipH="1" flipV="1">
+            <a:off x="4392420" y="3080667"/>
+            <a:ext cx="176672" cy="132732"/>
+          </a:xfrm>
+          <a:prstGeom prst="straightConnector1">
+            <a:avLst/>
+          </a:prstGeom>
+          <a:ln w="19050">
+            <a:solidFill>
+              <a:schemeClr val="accent1"/>
+            </a:solidFill>
+            <a:tailEnd type="triangle"/>
+          </a:ln>
+        </p:spPr>
+        <p:style>
+          <a:lnRef idx="1">
+            <a:schemeClr val="accent1"/>
+          </a:lnRef>
+          <a:fillRef idx="0">
+            <a:schemeClr val="accent1"/>
+          </a:fillRef>
+          <a:effectRef idx="0">
+            <a:schemeClr val="accent1"/>
+          </a:effectRef>
+          <a:fontRef idx="minor">
+            <a:schemeClr val="tx1"/>
+          </a:fontRef>
+        </p:style>
+      </p:cxnSp>
+      <p:cxnSp>
+        <p:nvCxnSpPr>
+          <p:cNvPr id="40" name="Straight Arrow Connector 39">
+            <a:extLst>
+              <a:ext uri="{FF2B5EF4-FFF2-40B4-BE49-F238E27FC236}">
+                <a16:creationId xmlns:a16="http://schemas.microsoft.com/office/drawing/2014/main" id="{A0BED340-4822-4723-A524-1583C4556BBC}"/>
+              </a:ext>
+            </a:extLst>
+          </p:cNvPr>
+          <p:cNvCxnSpPr>
+            <a:cxnSpLocks/>
+            <a:stCxn id="38" idx="1"/>
+            <a:endCxn id="2" idx="6"/>
+          </p:cNvCxnSpPr>
+          <p:nvPr/>
+        </p:nvCxnSpPr>
+        <p:spPr>
+          <a:xfrm flipH="1" flipV="1">
+            <a:off x="4459867" y="2934176"/>
+            <a:ext cx="569784" cy="382465"/>
+          </a:xfrm>
+          <a:prstGeom prst="straightConnector1">
+            <a:avLst/>
+          </a:prstGeom>
+          <a:ln w="19050">
+            <a:solidFill>
+              <a:schemeClr val="accent1"/>
+            </a:solidFill>
+            <a:tailEnd type="triangle"/>
+          </a:ln>
+        </p:spPr>
+        <p:style>
+          <a:lnRef idx="1">
+            <a:schemeClr val="accent1"/>
+          </a:lnRef>
+          <a:fillRef idx="0">
+            <a:schemeClr val="accent1"/>
+          </a:fillRef>
+          <a:effectRef idx="0">
+            <a:schemeClr val="accent1"/>
+          </a:effectRef>
+          <a:fontRef idx="minor">
+            <a:schemeClr val="tx1"/>
+          </a:fontRef>
+        </p:style>
+      </p:cxnSp>
+      <p:cxnSp>
+        <p:nvCxnSpPr>
+          <p:cNvPr id="54" name="Straight Arrow Connector 53">
+            <a:extLst>
+              <a:ext uri="{FF2B5EF4-FFF2-40B4-BE49-F238E27FC236}">
+                <a16:creationId xmlns:a16="http://schemas.microsoft.com/office/drawing/2014/main" id="{BCBDA54A-13C2-4E1A-8696-18542055C789}"/>
+              </a:ext>
+            </a:extLst>
+          </p:cNvPr>
+          <p:cNvCxnSpPr>
+            <a:cxnSpLocks/>
+            <a:stCxn id="9" idx="7"/>
+            <a:endCxn id="37" idx="3"/>
+          </p:cNvCxnSpPr>
+          <p:nvPr/>
+        </p:nvCxnSpPr>
+        <p:spPr>
+          <a:xfrm flipV="1">
+            <a:off x="3999308" y="3628034"/>
+            <a:ext cx="376147" cy="303588"/>
+          </a:xfrm>
+          <a:prstGeom prst="straightConnector1">
+            <a:avLst/>
+          </a:prstGeom>
+          <a:ln w="19050">
+            <a:solidFill>
+              <a:schemeClr val="accent1"/>
+            </a:solidFill>
+            <a:tailEnd type="triangle"/>
+          </a:ln>
+        </p:spPr>
+        <p:style>
+          <a:lnRef idx="1">
+            <a:schemeClr val="accent1"/>
+          </a:lnRef>
+          <a:fillRef idx="0">
+            <a:schemeClr val="accent1"/>
+          </a:fillRef>
+          <a:effectRef idx="0">
+            <a:schemeClr val="accent1"/>
+          </a:effectRef>
+          <a:fontRef idx="minor">
+            <a:schemeClr val="tx1"/>
+          </a:fontRef>
+        </p:style>
+      </p:cxnSp>
+      <p:cxnSp>
+        <p:nvCxnSpPr>
+          <p:cNvPr id="55" name="Straight Arrow Connector 54">
+            <a:extLst>
+              <a:ext uri="{FF2B5EF4-FFF2-40B4-BE49-F238E27FC236}">
+                <a16:creationId xmlns:a16="http://schemas.microsoft.com/office/drawing/2014/main" id="{4B2B2108-B552-493A-B517-E02B1F4CBA63}"/>
+              </a:ext>
+            </a:extLst>
+          </p:cNvPr>
+          <p:cNvCxnSpPr>
+            <a:cxnSpLocks/>
+            <a:stCxn id="10" idx="7"/>
+            <a:endCxn id="38" idx="4"/>
+          </p:cNvCxnSpPr>
+          <p:nvPr/>
+        </p:nvCxnSpPr>
+        <p:spPr>
+          <a:xfrm flipV="1">
+            <a:off x="4848514" y="3731276"/>
+            <a:ext cx="374774" cy="200346"/>
+          </a:xfrm>
+          <a:prstGeom prst="straightConnector1">
+            <a:avLst/>
+          </a:prstGeom>
+          <a:ln w="19050">
+            <a:solidFill>
+              <a:schemeClr val="accent1"/>
+            </a:solidFill>
+            <a:tailEnd type="triangle"/>
+          </a:ln>
+        </p:spPr>
+        <p:style>
+          <a:lnRef idx="1">
+            <a:schemeClr val="accent1"/>
+          </a:lnRef>
+          <a:fillRef idx="0">
+            <a:schemeClr val="accent1"/>
+          </a:fillRef>
+          <a:effectRef idx="0">
+            <a:schemeClr val="accent1"/>
+          </a:effectRef>
+          <a:fontRef idx="minor">
+            <a:schemeClr val="tx1"/>
+          </a:fontRef>
+        </p:style>
+      </p:cxnSp>
+      <p:cxnSp>
+        <p:nvCxnSpPr>
+          <p:cNvPr id="56" name="Straight Arrow Connector 55">
+            <a:extLst>
+              <a:ext uri="{FF2B5EF4-FFF2-40B4-BE49-F238E27FC236}">
+                <a16:creationId xmlns:a16="http://schemas.microsoft.com/office/drawing/2014/main" id="{AD603677-CADD-464C-BE3E-B93EE222C49A}"/>
+              </a:ext>
+            </a:extLst>
+          </p:cNvPr>
+          <p:cNvCxnSpPr>
+            <a:cxnSpLocks/>
+            <a:stCxn id="10" idx="0"/>
+            <a:endCxn id="37" idx="4"/>
+          </p:cNvCxnSpPr>
+          <p:nvPr/>
+        </p:nvCxnSpPr>
+        <p:spPr>
+          <a:xfrm flipH="1" flipV="1">
+            <a:off x="4569092" y="3699174"/>
+            <a:ext cx="85785" cy="161308"/>
+          </a:xfrm>
+          <a:prstGeom prst="straightConnector1">
+            <a:avLst/>
+          </a:prstGeom>
+          <a:ln w="19050">
+            <a:solidFill>
+              <a:schemeClr val="accent1"/>
+            </a:solidFill>
+            <a:tailEnd type="triangle"/>
+          </a:ln>
+        </p:spPr>
+        <p:style>
+          <a:lnRef idx="1">
+            <a:schemeClr val="accent1"/>
+          </a:lnRef>
+          <a:fillRef idx="0">
+            <a:schemeClr val="accent1"/>
+          </a:fillRef>
+          <a:effectRef idx="0">
+            <a:schemeClr val="accent1"/>
+          </a:effectRef>
+          <a:fontRef idx="minor">
+            <a:schemeClr val="tx1"/>
+          </a:fontRef>
+        </p:style>
+      </p:cxnSp>
+      <p:cxnSp>
+        <p:nvCxnSpPr>
+          <p:cNvPr id="57" name="Straight Arrow Connector 56">
+            <a:extLst>
+              <a:ext uri="{FF2B5EF4-FFF2-40B4-BE49-F238E27FC236}">
+                <a16:creationId xmlns:a16="http://schemas.microsoft.com/office/drawing/2014/main" id="{D61E8199-CFB1-40B9-A93C-9984609B8484}"/>
+              </a:ext>
+            </a:extLst>
+          </p:cNvPr>
+          <p:cNvCxnSpPr>
+            <a:cxnSpLocks/>
+            <a:stCxn id="9" idx="7"/>
+            <a:endCxn id="38" idx="3"/>
+          </p:cNvCxnSpPr>
+          <p:nvPr/>
+        </p:nvCxnSpPr>
+        <p:spPr>
+          <a:xfrm flipV="1">
+            <a:off x="3999308" y="3660136"/>
+            <a:ext cx="1030343" cy="271486"/>
+          </a:xfrm>
+          <a:prstGeom prst="straightConnector1">
+            <a:avLst/>
+          </a:prstGeom>
+          <a:ln w="19050">
+            <a:solidFill>
+              <a:schemeClr val="accent1"/>
+            </a:solidFill>
+            <a:tailEnd type="triangle"/>
+          </a:ln>
+        </p:spPr>
+        <p:style>
+          <a:lnRef idx="1">
+            <a:schemeClr val="accent1"/>
+          </a:lnRef>
+          <a:fillRef idx="0">
+            <a:schemeClr val="accent1"/>
+          </a:fillRef>
+          <a:effectRef idx="0">
+            <a:schemeClr val="accent1"/>
+          </a:effectRef>
+          <a:fontRef idx="minor">
+            <a:schemeClr val="tx1"/>
+          </a:fontRef>
+        </p:style>
+      </p:cxnSp>
+      <p:sp>
+        <p:nvSpPr>
+          <p:cNvPr id="182" name="Oval 181">
+            <a:extLst>
+              <a:ext uri="{FF2B5EF4-FFF2-40B4-BE49-F238E27FC236}">
+                <a16:creationId xmlns:a16="http://schemas.microsoft.com/office/drawing/2014/main" id="{B6998DF2-753B-4C9A-99FA-E57222E62845}"/>
+              </a:ext>
+            </a:extLst>
+          </p:cNvPr>
+          <p:cNvSpPr/>
+          <p:nvPr/>
+        </p:nvSpPr>
+        <p:spPr>
+          <a:xfrm>
+            <a:off x="1704031" y="2645566"/>
+            <a:ext cx="460559" cy="414338"/>
+          </a:xfrm>
+          <a:prstGeom prst="ellipse">
+            <a:avLst/>
+          </a:prstGeom>
+          <a:noFill/>
+        </p:spPr>
+        <p:style>
+          <a:lnRef idx="2">
+            <a:schemeClr val="accent1">
+              <a:shade val="50000"/>
+            </a:schemeClr>
+          </a:lnRef>
+          <a:fillRef idx="1">
+            <a:schemeClr val="accent1"/>
+          </a:fillRef>
+          <a:effectRef idx="0">
+            <a:schemeClr val="accent1"/>
+          </a:effectRef>
+          <a:fontRef idx="minor">
+            <a:schemeClr val="lt1"/>
+          </a:fontRef>
+        </p:style>
+        <p:txBody>
+          <a:bodyPr rtlCol="0" anchor="ctr"/>
+          <a:lstStyle/>
+          <a:p>
+            <a:pPr algn="ctr"/>
+            <a:r>
+              <a:rPr lang="en-US" dirty="0">
+                <a:solidFill>
+                  <a:schemeClr val="tx1"/>
+                </a:solidFill>
+              </a:rPr>
+              <a:t>O</a:t>
+            </a:r>
+          </a:p>
+        </p:txBody>
+      </p:sp>
+      <p:sp>
+        <p:nvSpPr>
+          <p:cNvPr id="185" name="Oval 184">
+            <a:extLst>
+              <a:ext uri="{FF2B5EF4-FFF2-40B4-BE49-F238E27FC236}">
+                <a16:creationId xmlns:a16="http://schemas.microsoft.com/office/drawing/2014/main" id="{E5C3009A-B95A-4039-9A53-07E2C14F3613}"/>
+              </a:ext>
+            </a:extLst>
+          </p:cNvPr>
+          <p:cNvSpPr/>
+          <p:nvPr/>
+        </p:nvSpPr>
+        <p:spPr>
+          <a:xfrm>
+            <a:off x="1236550" y="3779041"/>
+            <a:ext cx="547688" cy="485775"/>
+          </a:xfrm>
+          <a:prstGeom prst="ellipse">
+            <a:avLst/>
+          </a:prstGeom>
+          <a:noFill/>
+        </p:spPr>
+        <p:style>
+          <a:lnRef idx="2">
+            <a:schemeClr val="accent1">
+              <a:shade val="50000"/>
+            </a:schemeClr>
+          </a:lnRef>
+          <a:fillRef idx="1">
+            <a:schemeClr val="accent1"/>
+          </a:fillRef>
+          <a:effectRef idx="0">
+            <a:schemeClr val="accent1"/>
+          </a:effectRef>
+          <a:fontRef idx="minor">
+            <a:schemeClr val="lt1"/>
+          </a:fontRef>
+        </p:style>
+        <p:txBody>
+          <a:bodyPr rtlCol="0" anchor="ctr"/>
+          <a:lstStyle/>
+          <a:p>
+            <a:pPr algn="ctr"/>
+            <a:r>
+              <a:rPr lang="en-US" dirty="0">
+                <a:solidFill>
+                  <a:schemeClr val="tx1"/>
+                </a:solidFill>
+              </a:rPr>
+              <a:t>i</a:t>
+            </a:r>
+            <a:r>
+              <a:rPr lang="en-US" baseline="-25000" dirty="0">
+                <a:solidFill>
+                  <a:schemeClr val="tx1"/>
+                </a:solidFill>
+              </a:rPr>
+              <a:t>1</a:t>
+            </a:r>
+          </a:p>
+        </p:txBody>
+      </p:sp>
+      <p:sp>
+        <p:nvSpPr>
+          <p:cNvPr id="186" name="Oval 185">
+            <a:extLst>
+              <a:ext uri="{FF2B5EF4-FFF2-40B4-BE49-F238E27FC236}">
+                <a16:creationId xmlns:a16="http://schemas.microsoft.com/office/drawing/2014/main" id="{CA4FBA4A-EDA7-4279-8557-FCCE097B0222}"/>
+              </a:ext>
+            </a:extLst>
+          </p:cNvPr>
+          <p:cNvSpPr/>
+          <p:nvPr/>
+        </p:nvSpPr>
+        <p:spPr>
+          <a:xfrm>
+            <a:off x="2085756" y="3779041"/>
+            <a:ext cx="547688" cy="485775"/>
+          </a:xfrm>
+          <a:prstGeom prst="ellipse">
+            <a:avLst/>
+          </a:prstGeom>
+          <a:noFill/>
+        </p:spPr>
+        <p:style>
+          <a:lnRef idx="2">
+            <a:schemeClr val="accent1">
+              <a:shade val="50000"/>
+            </a:schemeClr>
+          </a:lnRef>
+          <a:fillRef idx="1">
+            <a:schemeClr val="accent1"/>
+          </a:fillRef>
+          <a:effectRef idx="0">
+            <a:schemeClr val="accent1"/>
+          </a:effectRef>
+          <a:fontRef idx="minor">
+            <a:schemeClr val="lt1"/>
+          </a:fontRef>
+        </p:style>
+        <p:txBody>
+          <a:bodyPr rtlCol="0" anchor="ctr"/>
+          <a:lstStyle/>
+          <a:p>
+            <a:pPr algn="ctr"/>
+            <a:r>
+              <a:rPr lang="en-US" dirty="0">
+                <a:solidFill>
+                  <a:schemeClr val="tx1"/>
+                </a:solidFill>
+              </a:rPr>
+              <a:t>i</a:t>
+            </a:r>
+            <a:r>
+              <a:rPr lang="en-US" baseline="-25000" dirty="0">
+                <a:solidFill>
+                  <a:schemeClr val="tx1"/>
+                </a:solidFill>
+              </a:rPr>
+              <a:t>2</a:t>
+            </a:r>
+          </a:p>
+        </p:txBody>
+      </p:sp>
+      <p:sp>
+        <p:nvSpPr>
+          <p:cNvPr id="194" name="Oval 193">
+            <a:extLst>
+              <a:ext uri="{FF2B5EF4-FFF2-40B4-BE49-F238E27FC236}">
+                <a16:creationId xmlns:a16="http://schemas.microsoft.com/office/drawing/2014/main" id="{8EAC6122-9331-46E8-B9E4-32647FCC1220}"/>
+              </a:ext>
+            </a:extLst>
+          </p:cNvPr>
+          <p:cNvSpPr/>
+          <p:nvPr/>
+        </p:nvSpPr>
+        <p:spPr>
+          <a:xfrm>
+            <a:off x="2654167" y="3107530"/>
+            <a:ext cx="547688" cy="542306"/>
+          </a:xfrm>
+          <a:prstGeom prst="ellipse">
+            <a:avLst/>
+          </a:prstGeom>
+          <a:noFill/>
+        </p:spPr>
+        <p:style>
+          <a:lnRef idx="2">
+            <a:schemeClr val="accent1">
+              <a:shade val="50000"/>
+            </a:schemeClr>
+          </a:lnRef>
+          <a:fillRef idx="1">
+            <a:schemeClr val="accent1"/>
+          </a:fillRef>
+          <a:effectRef idx="0">
+            <a:schemeClr val="accent1"/>
+          </a:effectRef>
+          <a:fontRef idx="minor">
+            <a:schemeClr val="lt1"/>
+          </a:fontRef>
+        </p:style>
+        <p:txBody>
+          <a:bodyPr rtlCol="0" anchor="ctr"/>
+          <a:lstStyle/>
+          <a:p>
+            <a:pPr algn="ctr"/>
+            <a:r>
+              <a:rPr lang="en-US" dirty="0">
+                <a:solidFill>
+                  <a:schemeClr val="tx1"/>
+                </a:solidFill>
+              </a:rPr>
+              <a:t>h</a:t>
+            </a:r>
+            <a:r>
+              <a:rPr lang="en-US" baseline="-25000" dirty="0">
+                <a:solidFill>
+                  <a:schemeClr val="tx1"/>
+                </a:solidFill>
+              </a:rPr>
+              <a:t>4</a:t>
+            </a:r>
+          </a:p>
+        </p:txBody>
+      </p:sp>
+      <p:cxnSp>
+        <p:nvCxnSpPr>
+          <p:cNvPr id="196" name="Straight Arrow Connector 195">
+            <a:extLst>
+              <a:ext uri="{FF2B5EF4-FFF2-40B4-BE49-F238E27FC236}">
+                <a16:creationId xmlns:a16="http://schemas.microsoft.com/office/drawing/2014/main" id="{AF339FF5-18CA-46E7-85F6-1691C68E7251}"/>
+              </a:ext>
+            </a:extLst>
+          </p:cNvPr>
+          <p:cNvCxnSpPr>
+            <a:cxnSpLocks/>
+            <a:stCxn id="194" idx="1"/>
+            <a:endCxn id="182" idx="6"/>
+          </p:cNvCxnSpPr>
+          <p:nvPr/>
+        </p:nvCxnSpPr>
+        <p:spPr>
+          <a:xfrm flipH="1" flipV="1">
+            <a:off x="2164590" y="2852735"/>
+            <a:ext cx="569784" cy="334214"/>
+          </a:xfrm>
+          <a:prstGeom prst="straightConnector1">
+            <a:avLst/>
+          </a:prstGeom>
+          <a:ln w="19050">
+            <a:solidFill>
+              <a:schemeClr val="accent1"/>
+            </a:solidFill>
+            <a:tailEnd type="triangle"/>
+          </a:ln>
+        </p:spPr>
+        <p:style>
+          <a:lnRef idx="1">
+            <a:schemeClr val="accent1"/>
+          </a:lnRef>
+          <a:fillRef idx="0">
+            <a:schemeClr val="accent1"/>
+          </a:fillRef>
+          <a:effectRef idx="0">
+            <a:schemeClr val="accent1"/>
+          </a:effectRef>
+          <a:fontRef idx="minor">
+            <a:schemeClr val="tx1"/>
+          </a:fontRef>
+        </p:style>
+      </p:cxnSp>
+      <p:cxnSp>
+        <p:nvCxnSpPr>
+          <p:cNvPr id="198" name="Straight Arrow Connector 197">
+            <a:extLst>
+              <a:ext uri="{FF2B5EF4-FFF2-40B4-BE49-F238E27FC236}">
+                <a16:creationId xmlns:a16="http://schemas.microsoft.com/office/drawing/2014/main" id="{16F2C6D1-346F-4B84-9F33-DDC30500A074}"/>
+              </a:ext>
+            </a:extLst>
+          </p:cNvPr>
+          <p:cNvCxnSpPr>
+            <a:cxnSpLocks/>
+            <a:stCxn id="186" idx="7"/>
+            <a:endCxn id="194" idx="4"/>
+          </p:cNvCxnSpPr>
+          <p:nvPr/>
+        </p:nvCxnSpPr>
+        <p:spPr>
+          <a:xfrm flipV="1">
+            <a:off x="2553237" y="3649836"/>
+            <a:ext cx="374774" cy="200345"/>
+          </a:xfrm>
+          <a:prstGeom prst="straightConnector1">
+            <a:avLst/>
+          </a:prstGeom>
+          <a:ln w="19050">
+            <a:solidFill>
+              <a:schemeClr val="accent1"/>
+            </a:solidFill>
+            <a:tailEnd type="triangle"/>
+          </a:ln>
+        </p:spPr>
+        <p:style>
+          <a:lnRef idx="1">
+            <a:schemeClr val="accent1"/>
+          </a:lnRef>
+          <a:fillRef idx="0">
+            <a:schemeClr val="accent1"/>
+          </a:fillRef>
+          <a:effectRef idx="0">
+            <a:schemeClr val="accent1"/>
+          </a:effectRef>
+          <a:fontRef idx="minor">
+            <a:schemeClr val="tx1"/>
+          </a:fontRef>
+        </p:style>
+      </p:cxnSp>
+      <p:cxnSp>
+        <p:nvCxnSpPr>
+          <p:cNvPr id="200" name="Straight Arrow Connector 199">
+            <a:extLst>
+              <a:ext uri="{FF2B5EF4-FFF2-40B4-BE49-F238E27FC236}">
+                <a16:creationId xmlns:a16="http://schemas.microsoft.com/office/drawing/2014/main" id="{C7F5CEC6-4738-4FE3-96CC-F386B86EFB79}"/>
+              </a:ext>
+            </a:extLst>
+          </p:cNvPr>
+          <p:cNvCxnSpPr>
+            <a:cxnSpLocks/>
+            <a:stCxn id="185" idx="7"/>
+            <a:endCxn id="194" idx="3"/>
+          </p:cNvCxnSpPr>
+          <p:nvPr/>
+        </p:nvCxnSpPr>
+        <p:spPr>
+          <a:xfrm flipV="1">
+            <a:off x="1704031" y="3570417"/>
+            <a:ext cx="1030343" cy="279764"/>
+          </a:xfrm>
+          <a:prstGeom prst="straightConnector1">
+            <a:avLst/>
+          </a:prstGeom>
+          <a:ln w="19050">
+            <a:solidFill>
+              <a:schemeClr val="accent1"/>
+            </a:solidFill>
+            <a:tailEnd type="triangle"/>
+          </a:ln>
+        </p:spPr>
+        <p:style>
+          <a:lnRef idx="1">
+            <a:schemeClr val="accent1"/>
+          </a:lnRef>
+          <a:fillRef idx="0">
+            <a:schemeClr val="accent1"/>
+          </a:fillRef>
+          <a:effectRef idx="0">
+            <a:schemeClr val="accent1"/>
+          </a:effectRef>
+          <a:fontRef idx="minor">
+            <a:schemeClr val="tx1"/>
+          </a:fontRef>
+        </p:style>
+      </p:cxnSp>
+      <p:sp>
+        <p:nvSpPr>
+          <p:cNvPr id="201" name="Oval 200">
+            <a:extLst>
+              <a:ext uri="{FF2B5EF4-FFF2-40B4-BE49-F238E27FC236}">
+                <a16:creationId xmlns:a16="http://schemas.microsoft.com/office/drawing/2014/main" id="{3576FA4B-42B8-40DB-A720-01610781E889}"/>
+              </a:ext>
+            </a:extLst>
+          </p:cNvPr>
+          <p:cNvSpPr/>
+          <p:nvPr/>
+        </p:nvSpPr>
+        <p:spPr>
+          <a:xfrm>
+            <a:off x="3889649" y="284514"/>
+            <a:ext cx="460559" cy="414338"/>
+          </a:xfrm>
+          <a:prstGeom prst="ellipse">
+            <a:avLst/>
+          </a:prstGeom>
+          <a:noFill/>
+        </p:spPr>
+        <p:style>
+          <a:lnRef idx="2">
+            <a:schemeClr val="accent1">
+              <a:shade val="50000"/>
+            </a:schemeClr>
+          </a:lnRef>
+          <a:fillRef idx="1">
+            <a:schemeClr val="accent1"/>
+          </a:fillRef>
+          <a:effectRef idx="0">
+            <a:schemeClr val="accent1"/>
+          </a:effectRef>
+          <a:fontRef idx="minor">
+            <a:schemeClr val="lt1"/>
+          </a:fontRef>
+        </p:style>
+        <p:txBody>
+          <a:bodyPr rtlCol="0" anchor="ctr"/>
+          <a:lstStyle/>
+          <a:p>
+            <a:pPr algn="ctr"/>
+            <a:r>
+              <a:rPr lang="en-US" dirty="0">
+                <a:solidFill>
+                  <a:schemeClr val="tx1"/>
+                </a:solidFill>
+              </a:rPr>
+              <a:t>O</a:t>
+            </a:r>
+          </a:p>
+        </p:txBody>
+      </p:sp>
+      <p:sp>
+        <p:nvSpPr>
+          <p:cNvPr id="203" name="Oval 202">
+            <a:extLst>
+              <a:ext uri="{FF2B5EF4-FFF2-40B4-BE49-F238E27FC236}">
+                <a16:creationId xmlns:a16="http://schemas.microsoft.com/office/drawing/2014/main" id="{9A0B7CF2-34F4-4FB4-886E-3B7DBC358464}"/>
+              </a:ext>
+            </a:extLst>
+          </p:cNvPr>
+          <p:cNvSpPr/>
+          <p:nvPr/>
+        </p:nvSpPr>
+        <p:spPr>
+          <a:xfrm>
+            <a:off x="3531393" y="789019"/>
+            <a:ext cx="547688" cy="485775"/>
+          </a:xfrm>
+          <a:prstGeom prst="ellipse">
+            <a:avLst/>
+          </a:prstGeom>
+          <a:noFill/>
+        </p:spPr>
+        <p:style>
+          <a:lnRef idx="2">
+            <a:schemeClr val="accent1">
+              <a:shade val="50000"/>
+            </a:schemeClr>
+          </a:lnRef>
+          <a:fillRef idx="1">
+            <a:schemeClr val="accent1"/>
+          </a:fillRef>
+          <a:effectRef idx="0">
+            <a:schemeClr val="accent1"/>
+          </a:effectRef>
+          <a:fontRef idx="minor">
+            <a:schemeClr val="lt1"/>
+          </a:fontRef>
+        </p:style>
+        <p:txBody>
+          <a:bodyPr rtlCol="0" anchor="ctr"/>
+          <a:lstStyle/>
+          <a:p>
+            <a:pPr algn="ctr"/>
+            <a:r>
+              <a:rPr lang="en-US" dirty="0">
+                <a:solidFill>
+                  <a:schemeClr val="tx1"/>
+                </a:solidFill>
+              </a:rPr>
+              <a:t>h</a:t>
+            </a:r>
+            <a:r>
+              <a:rPr lang="en-US" baseline="-25000" dirty="0">
+                <a:solidFill>
+                  <a:schemeClr val="tx1"/>
+                </a:solidFill>
+              </a:rPr>
+              <a:t>2</a:t>
+            </a:r>
+          </a:p>
+        </p:txBody>
+      </p:sp>
+      <p:sp>
+        <p:nvSpPr>
+          <p:cNvPr id="204" name="Oval 203">
+            <a:extLst>
+              <a:ext uri="{FF2B5EF4-FFF2-40B4-BE49-F238E27FC236}">
+                <a16:creationId xmlns:a16="http://schemas.microsoft.com/office/drawing/2014/main" id="{BA7C9393-13E2-4441-A26B-3962698C14E5}"/>
+              </a:ext>
+            </a:extLst>
+          </p:cNvPr>
+          <p:cNvSpPr/>
+          <p:nvPr/>
+        </p:nvSpPr>
+        <p:spPr>
+          <a:xfrm>
+            <a:off x="3422168" y="1417989"/>
+            <a:ext cx="547688" cy="485775"/>
+          </a:xfrm>
+          <a:prstGeom prst="ellipse">
+            <a:avLst/>
+          </a:prstGeom>
+          <a:noFill/>
+        </p:spPr>
+        <p:style>
+          <a:lnRef idx="2">
+            <a:schemeClr val="accent1">
+              <a:shade val="50000"/>
+            </a:schemeClr>
+          </a:lnRef>
+          <a:fillRef idx="1">
+            <a:schemeClr val="accent1"/>
+          </a:fillRef>
+          <a:effectRef idx="0">
+            <a:schemeClr val="accent1"/>
+          </a:effectRef>
+          <a:fontRef idx="minor">
+            <a:schemeClr val="lt1"/>
+          </a:fontRef>
+        </p:style>
+        <p:txBody>
+          <a:bodyPr rtlCol="0" anchor="ctr"/>
+          <a:lstStyle/>
+          <a:p>
+            <a:pPr algn="ctr"/>
+            <a:r>
+              <a:rPr lang="en-US" dirty="0">
+                <a:solidFill>
+                  <a:schemeClr val="tx1"/>
+                </a:solidFill>
+              </a:rPr>
+              <a:t>i</a:t>
+            </a:r>
+            <a:r>
+              <a:rPr lang="en-US" baseline="-25000" dirty="0">
+                <a:solidFill>
+                  <a:schemeClr val="tx1"/>
+                </a:solidFill>
+              </a:rPr>
+              <a:t>1</a:t>
+            </a:r>
+          </a:p>
+        </p:txBody>
+      </p:sp>
+      <p:sp>
+        <p:nvSpPr>
+          <p:cNvPr id="205" name="Oval 204">
+            <a:extLst>
+              <a:ext uri="{FF2B5EF4-FFF2-40B4-BE49-F238E27FC236}">
+                <a16:creationId xmlns:a16="http://schemas.microsoft.com/office/drawing/2014/main" id="{8B47327F-F563-485F-A082-1F1760F3CB5F}"/>
+              </a:ext>
+            </a:extLst>
+          </p:cNvPr>
+          <p:cNvSpPr/>
+          <p:nvPr/>
+        </p:nvSpPr>
+        <p:spPr>
+          <a:xfrm>
+            <a:off x="4271374" y="1417989"/>
+            <a:ext cx="547688" cy="485775"/>
+          </a:xfrm>
+          <a:prstGeom prst="ellipse">
+            <a:avLst/>
+          </a:prstGeom>
+          <a:noFill/>
+        </p:spPr>
+        <p:style>
+          <a:lnRef idx="2">
+            <a:schemeClr val="accent1">
+              <a:shade val="50000"/>
+            </a:schemeClr>
+          </a:lnRef>
+          <a:fillRef idx="1">
+            <a:schemeClr val="accent1"/>
+          </a:fillRef>
+          <a:effectRef idx="0">
+            <a:schemeClr val="accent1"/>
+          </a:effectRef>
+          <a:fontRef idx="minor">
+            <a:schemeClr val="lt1"/>
+          </a:fontRef>
+        </p:style>
+        <p:txBody>
+          <a:bodyPr rtlCol="0" anchor="ctr"/>
+          <a:lstStyle/>
+          <a:p>
+            <a:pPr algn="ctr"/>
+            <a:r>
+              <a:rPr lang="en-US" dirty="0">
+                <a:solidFill>
+                  <a:schemeClr val="tx1"/>
+                </a:solidFill>
+              </a:rPr>
+              <a:t>i</a:t>
+            </a:r>
+            <a:r>
+              <a:rPr lang="en-US" baseline="-25000" dirty="0">
+                <a:solidFill>
+                  <a:schemeClr val="tx1"/>
+                </a:solidFill>
+              </a:rPr>
+              <a:t>2</a:t>
+            </a:r>
+          </a:p>
+        </p:txBody>
+      </p:sp>
+      <p:cxnSp>
+        <p:nvCxnSpPr>
+          <p:cNvPr id="207" name="Straight Arrow Connector 206">
+            <a:extLst>
+              <a:ext uri="{FF2B5EF4-FFF2-40B4-BE49-F238E27FC236}">
+                <a16:creationId xmlns:a16="http://schemas.microsoft.com/office/drawing/2014/main" id="{2BC07131-6B01-4263-AF11-F240C31176FA}"/>
+              </a:ext>
+            </a:extLst>
+          </p:cNvPr>
+          <p:cNvCxnSpPr>
+            <a:cxnSpLocks/>
+            <a:stCxn id="203" idx="1"/>
+            <a:endCxn id="201" idx="3"/>
+          </p:cNvCxnSpPr>
+          <p:nvPr/>
+        </p:nvCxnSpPr>
+        <p:spPr>
+          <a:xfrm flipV="1">
+            <a:off x="3611600" y="638174"/>
+            <a:ext cx="345496" cy="221985"/>
+          </a:xfrm>
+          <a:prstGeom prst="straightConnector1">
+            <a:avLst/>
+          </a:prstGeom>
+          <a:ln w="19050">
+            <a:solidFill>
+              <a:schemeClr val="accent1"/>
+            </a:solidFill>
+            <a:tailEnd type="triangle"/>
+          </a:ln>
+        </p:spPr>
+        <p:style>
+          <a:lnRef idx="1">
+            <a:schemeClr val="accent1"/>
+          </a:lnRef>
+          <a:fillRef idx="0">
+            <a:schemeClr val="accent1"/>
+          </a:fillRef>
+          <a:effectRef idx="0">
+            <a:schemeClr val="accent1"/>
+          </a:effectRef>
+          <a:fontRef idx="minor">
+            <a:schemeClr val="tx1"/>
+          </a:fontRef>
+        </p:style>
+      </p:cxnSp>
+      <p:cxnSp>
+        <p:nvCxnSpPr>
+          <p:cNvPr id="209" name="Straight Arrow Connector 208">
+            <a:extLst>
+              <a:ext uri="{FF2B5EF4-FFF2-40B4-BE49-F238E27FC236}">
+                <a16:creationId xmlns:a16="http://schemas.microsoft.com/office/drawing/2014/main" id="{07B4C3AF-8509-4933-9BD5-E4BB5BCADBE7}"/>
+              </a:ext>
+            </a:extLst>
+          </p:cNvPr>
+          <p:cNvCxnSpPr>
+            <a:cxnSpLocks/>
+            <a:stCxn id="205" idx="0"/>
+            <a:endCxn id="203" idx="4"/>
+          </p:cNvCxnSpPr>
+          <p:nvPr/>
+        </p:nvCxnSpPr>
+        <p:spPr>
+          <a:xfrm flipH="1" flipV="1">
+            <a:off x="3805237" y="1274794"/>
+            <a:ext cx="739981" cy="143195"/>
+          </a:xfrm>
+          <a:prstGeom prst="straightConnector1">
+            <a:avLst/>
+          </a:prstGeom>
+          <a:ln w="19050">
+            <a:solidFill>
+              <a:schemeClr val="accent1"/>
+            </a:solidFill>
+            <a:tailEnd type="triangle"/>
+          </a:ln>
+        </p:spPr>
+        <p:style>
+          <a:lnRef idx="1">
+            <a:schemeClr val="accent1"/>
+          </a:lnRef>
+          <a:fillRef idx="0">
+            <a:schemeClr val="accent1"/>
+          </a:fillRef>
+          <a:effectRef idx="0">
+            <a:schemeClr val="accent1"/>
+          </a:effectRef>
+          <a:fontRef idx="minor">
+            <a:schemeClr val="tx1"/>
+          </a:fontRef>
+        </p:style>
+      </p:cxnSp>
+      <p:cxnSp>
+        <p:nvCxnSpPr>
+          <p:cNvPr id="211" name="Straight Arrow Connector 210">
+            <a:extLst>
+              <a:ext uri="{FF2B5EF4-FFF2-40B4-BE49-F238E27FC236}">
+                <a16:creationId xmlns:a16="http://schemas.microsoft.com/office/drawing/2014/main" id="{B7CD749E-FCA4-4F1F-96D6-7E6A85876FC8}"/>
+              </a:ext>
+            </a:extLst>
+          </p:cNvPr>
+          <p:cNvCxnSpPr>
+            <a:cxnSpLocks/>
+            <a:endCxn id="203" idx="3"/>
+          </p:cNvCxnSpPr>
+          <p:nvPr/>
+        </p:nvCxnSpPr>
+        <p:spPr>
+          <a:xfrm flipH="1" flipV="1">
+            <a:off x="3611600" y="1203654"/>
+            <a:ext cx="230966" cy="275928"/>
+          </a:xfrm>
+          <a:prstGeom prst="straightConnector1">
+            <a:avLst/>
+          </a:prstGeom>
+          <a:ln w="19050">
+            <a:solidFill>
+              <a:schemeClr val="accent1"/>
+            </a:solidFill>
+            <a:tailEnd type="triangle"/>
+          </a:ln>
+        </p:spPr>
+        <p:style>
+          <a:lnRef idx="1">
+            <a:schemeClr val="accent1"/>
+          </a:lnRef>
+          <a:fillRef idx="0">
+            <a:schemeClr val="accent1"/>
+          </a:fillRef>
+          <a:effectRef idx="0">
+            <a:schemeClr val="accent1"/>
+          </a:effectRef>
+          <a:fontRef idx="minor">
+            <a:schemeClr val="tx1"/>
+          </a:fontRef>
+        </p:style>
+      </p:cxnSp>
+      <p:sp>
+        <p:nvSpPr>
+          <p:cNvPr id="220" name="Oval 219">
+            <a:extLst>
+              <a:ext uri="{FF2B5EF4-FFF2-40B4-BE49-F238E27FC236}">
+                <a16:creationId xmlns:a16="http://schemas.microsoft.com/office/drawing/2014/main" id="{7CD00E87-790C-46AD-9F86-A157CE9150E8}"/>
+              </a:ext>
+            </a:extLst>
+          </p:cNvPr>
+          <p:cNvSpPr/>
+          <p:nvPr/>
+        </p:nvSpPr>
+        <p:spPr>
+          <a:xfrm>
+            <a:off x="6549971" y="316616"/>
+            <a:ext cx="460559" cy="414338"/>
+          </a:xfrm>
+          <a:prstGeom prst="ellipse">
+            <a:avLst/>
+          </a:prstGeom>
+          <a:noFill/>
+        </p:spPr>
+        <p:style>
+          <a:lnRef idx="2">
+            <a:schemeClr val="accent1">
+              <a:shade val="50000"/>
+            </a:schemeClr>
+          </a:lnRef>
+          <a:fillRef idx="1">
+            <a:schemeClr val="accent1"/>
+          </a:fillRef>
+          <a:effectRef idx="0">
+            <a:schemeClr val="accent1"/>
+          </a:effectRef>
+          <a:fontRef idx="minor">
+            <a:schemeClr val="lt1"/>
+          </a:fontRef>
+        </p:style>
+        <p:txBody>
+          <a:bodyPr rtlCol="0" anchor="ctr"/>
+          <a:lstStyle/>
+          <a:p>
+            <a:pPr algn="ctr"/>
+            <a:r>
+              <a:rPr lang="en-US" dirty="0">
+                <a:solidFill>
+                  <a:schemeClr val="tx1"/>
+                </a:solidFill>
+              </a:rPr>
+              <a:t>O</a:t>
+            </a:r>
+          </a:p>
+        </p:txBody>
+      </p:sp>
+      <p:sp>
+        <p:nvSpPr>
+          <p:cNvPr id="223" name="Oval 222">
+            <a:extLst>
+              <a:ext uri="{FF2B5EF4-FFF2-40B4-BE49-F238E27FC236}">
+                <a16:creationId xmlns:a16="http://schemas.microsoft.com/office/drawing/2014/main" id="{CC86BC2D-2817-47AC-BCD7-8B2297004B2F}"/>
+              </a:ext>
+            </a:extLst>
+          </p:cNvPr>
+          <p:cNvSpPr/>
+          <p:nvPr/>
+        </p:nvSpPr>
+        <p:spPr>
+          <a:xfrm>
+            <a:off x="6082490" y="1450091"/>
+            <a:ext cx="547688" cy="485775"/>
+          </a:xfrm>
+          <a:prstGeom prst="ellipse">
+            <a:avLst/>
+          </a:prstGeom>
+          <a:noFill/>
+        </p:spPr>
+        <p:style>
+          <a:lnRef idx="2">
+            <a:schemeClr val="accent1">
+              <a:shade val="50000"/>
+            </a:schemeClr>
+          </a:lnRef>
+          <a:fillRef idx="1">
+            <a:schemeClr val="accent1"/>
+          </a:fillRef>
+          <a:effectRef idx="0">
+            <a:schemeClr val="accent1"/>
+          </a:effectRef>
+          <a:fontRef idx="minor">
+            <a:schemeClr val="lt1"/>
+          </a:fontRef>
+        </p:style>
+        <p:txBody>
+          <a:bodyPr rtlCol="0" anchor="ctr"/>
+          <a:lstStyle/>
+          <a:p>
+            <a:pPr algn="ctr"/>
+            <a:r>
+              <a:rPr lang="en-US" dirty="0">
+                <a:solidFill>
+                  <a:schemeClr val="tx1"/>
+                </a:solidFill>
+              </a:rPr>
+              <a:t>i</a:t>
+            </a:r>
+            <a:r>
+              <a:rPr lang="en-US" baseline="-25000" dirty="0">
+                <a:solidFill>
+                  <a:schemeClr val="tx1"/>
+                </a:solidFill>
+              </a:rPr>
+              <a:t>1</a:t>
+            </a:r>
+          </a:p>
+        </p:txBody>
+      </p:sp>
+      <p:sp>
+        <p:nvSpPr>
+          <p:cNvPr id="224" name="Oval 223">
+            <a:extLst>
+              <a:ext uri="{FF2B5EF4-FFF2-40B4-BE49-F238E27FC236}">
+                <a16:creationId xmlns:a16="http://schemas.microsoft.com/office/drawing/2014/main" id="{D509C45C-1EB3-4DD0-8609-3E2E7D2686EB}"/>
+              </a:ext>
+            </a:extLst>
+          </p:cNvPr>
+          <p:cNvSpPr/>
+          <p:nvPr/>
+        </p:nvSpPr>
+        <p:spPr>
+          <a:xfrm>
+            <a:off x="6931696" y="1450091"/>
+            <a:ext cx="547688" cy="485775"/>
+          </a:xfrm>
+          <a:prstGeom prst="ellipse">
+            <a:avLst/>
+          </a:prstGeom>
+          <a:noFill/>
+        </p:spPr>
+        <p:style>
+          <a:lnRef idx="2">
+            <a:schemeClr val="accent1">
+              <a:shade val="50000"/>
+            </a:schemeClr>
+          </a:lnRef>
+          <a:fillRef idx="1">
+            <a:schemeClr val="accent1"/>
+          </a:fillRef>
+          <a:effectRef idx="0">
+            <a:schemeClr val="accent1"/>
+          </a:effectRef>
+          <a:fontRef idx="minor">
+            <a:schemeClr val="lt1"/>
+          </a:fontRef>
+        </p:style>
+        <p:txBody>
+          <a:bodyPr rtlCol="0" anchor="ctr"/>
+          <a:lstStyle/>
+          <a:p>
+            <a:pPr algn="ctr"/>
+            <a:r>
+              <a:rPr lang="en-US" dirty="0">
+                <a:solidFill>
+                  <a:schemeClr val="tx1"/>
+                </a:solidFill>
+              </a:rPr>
+              <a:t>i</a:t>
+            </a:r>
+            <a:r>
+              <a:rPr lang="en-US" baseline="-25000" dirty="0">
+                <a:solidFill>
+                  <a:schemeClr val="tx1"/>
+                </a:solidFill>
+              </a:rPr>
+              <a:t>2</a:t>
+            </a:r>
+          </a:p>
+        </p:txBody>
+      </p:sp>
+      <p:sp>
+        <p:nvSpPr>
+          <p:cNvPr id="231" name="Oval 230">
+            <a:extLst>
+              <a:ext uri="{FF2B5EF4-FFF2-40B4-BE49-F238E27FC236}">
+                <a16:creationId xmlns:a16="http://schemas.microsoft.com/office/drawing/2014/main" id="{60BB06FE-E0B3-4E0B-A0EF-7F56B1B27A31}"/>
+              </a:ext>
+            </a:extLst>
+          </p:cNvPr>
+          <p:cNvSpPr/>
+          <p:nvPr/>
+        </p:nvSpPr>
+        <p:spPr>
+          <a:xfrm>
+            <a:off x="6845911" y="803008"/>
+            <a:ext cx="547688" cy="485775"/>
+          </a:xfrm>
+          <a:prstGeom prst="ellipse">
+            <a:avLst/>
+          </a:prstGeom>
+          <a:noFill/>
+        </p:spPr>
+        <p:style>
+          <a:lnRef idx="2">
+            <a:schemeClr val="accent1">
+              <a:shade val="50000"/>
+            </a:schemeClr>
+          </a:lnRef>
+          <a:fillRef idx="1">
+            <a:schemeClr val="accent1"/>
+          </a:fillRef>
+          <a:effectRef idx="0">
+            <a:schemeClr val="accent1"/>
+          </a:effectRef>
+          <a:fontRef idx="minor">
+            <a:schemeClr val="lt1"/>
+          </a:fontRef>
+        </p:style>
+        <p:txBody>
+          <a:bodyPr rtlCol="0" anchor="ctr"/>
+          <a:lstStyle/>
+          <a:p>
+            <a:pPr algn="ctr"/>
+            <a:r>
+              <a:rPr lang="en-US" dirty="0">
+                <a:solidFill>
+                  <a:schemeClr val="tx1"/>
+                </a:solidFill>
+              </a:rPr>
+              <a:t>h</a:t>
+            </a:r>
+            <a:r>
+              <a:rPr lang="en-US" baseline="-25000" dirty="0">
+                <a:solidFill>
+                  <a:schemeClr val="tx1"/>
+                </a:solidFill>
+              </a:rPr>
+              <a:t>3</a:t>
+            </a:r>
+          </a:p>
+        </p:txBody>
+      </p:sp>
+      <p:cxnSp>
+        <p:nvCxnSpPr>
+          <p:cNvPr id="233" name="Straight Arrow Connector 232">
+            <a:extLst>
+              <a:ext uri="{FF2B5EF4-FFF2-40B4-BE49-F238E27FC236}">
+                <a16:creationId xmlns:a16="http://schemas.microsoft.com/office/drawing/2014/main" id="{1B67C3E4-DD5A-488A-B642-4CE60A7AC9E7}"/>
+              </a:ext>
+            </a:extLst>
+          </p:cNvPr>
+          <p:cNvCxnSpPr>
+            <a:cxnSpLocks/>
+            <a:stCxn id="231" idx="0"/>
+            <a:endCxn id="220" idx="5"/>
+          </p:cNvCxnSpPr>
+          <p:nvPr/>
+        </p:nvCxnSpPr>
+        <p:spPr>
+          <a:xfrm flipH="1" flipV="1">
+            <a:off x="6943083" y="670276"/>
+            <a:ext cx="176672" cy="132732"/>
+          </a:xfrm>
+          <a:prstGeom prst="straightConnector1">
+            <a:avLst/>
+          </a:prstGeom>
+          <a:ln w="19050">
+            <a:solidFill>
+              <a:schemeClr val="accent1"/>
+            </a:solidFill>
+            <a:tailEnd type="triangle"/>
+          </a:ln>
+        </p:spPr>
+        <p:style>
+          <a:lnRef idx="1">
+            <a:schemeClr val="accent1"/>
+          </a:lnRef>
+          <a:fillRef idx="0">
+            <a:schemeClr val="accent1"/>
+          </a:fillRef>
+          <a:effectRef idx="0">
+            <a:schemeClr val="accent1"/>
+          </a:effectRef>
+          <a:fontRef idx="minor">
+            <a:schemeClr val="tx1"/>
+          </a:fontRef>
+        </p:style>
+      </p:cxnSp>
+      <p:cxnSp>
+        <p:nvCxnSpPr>
+          <p:cNvPr id="235" name="Straight Arrow Connector 234">
+            <a:extLst>
+              <a:ext uri="{FF2B5EF4-FFF2-40B4-BE49-F238E27FC236}">
+                <a16:creationId xmlns:a16="http://schemas.microsoft.com/office/drawing/2014/main" id="{DB752649-E8FF-415D-AD4E-C09AF7709C87}"/>
+              </a:ext>
+            </a:extLst>
+          </p:cNvPr>
+          <p:cNvCxnSpPr>
+            <a:cxnSpLocks/>
+            <a:stCxn id="223" idx="7"/>
+            <a:endCxn id="231" idx="3"/>
+          </p:cNvCxnSpPr>
+          <p:nvPr/>
+        </p:nvCxnSpPr>
+        <p:spPr>
+          <a:xfrm flipV="1">
+            <a:off x="6549971" y="1217643"/>
+            <a:ext cx="376147" cy="303588"/>
+          </a:xfrm>
+          <a:prstGeom prst="straightConnector1">
+            <a:avLst/>
+          </a:prstGeom>
+          <a:ln w="19050">
+            <a:solidFill>
+              <a:schemeClr val="accent1"/>
+            </a:solidFill>
+            <a:tailEnd type="triangle"/>
+          </a:ln>
+        </p:spPr>
+        <p:style>
+          <a:lnRef idx="1">
+            <a:schemeClr val="accent1"/>
+          </a:lnRef>
+          <a:fillRef idx="0">
+            <a:schemeClr val="accent1"/>
+          </a:fillRef>
+          <a:effectRef idx="0">
+            <a:schemeClr val="accent1"/>
+          </a:effectRef>
+          <a:fontRef idx="minor">
+            <a:schemeClr val="tx1"/>
+          </a:fontRef>
+        </p:style>
+      </p:cxnSp>
+      <p:cxnSp>
+        <p:nvCxnSpPr>
+          <p:cNvPr id="237" name="Straight Arrow Connector 236">
+            <a:extLst>
+              <a:ext uri="{FF2B5EF4-FFF2-40B4-BE49-F238E27FC236}">
+                <a16:creationId xmlns:a16="http://schemas.microsoft.com/office/drawing/2014/main" id="{A93B64D2-5D01-46BD-BFA4-2A459788209E}"/>
+              </a:ext>
+            </a:extLst>
+          </p:cNvPr>
+          <p:cNvCxnSpPr>
+            <a:cxnSpLocks/>
+            <a:stCxn id="224" idx="0"/>
+            <a:endCxn id="231" idx="4"/>
+          </p:cNvCxnSpPr>
+          <p:nvPr/>
+        </p:nvCxnSpPr>
+        <p:spPr>
+          <a:xfrm flipH="1" flipV="1">
+            <a:off x="7119755" y="1288783"/>
+            <a:ext cx="85785" cy="161308"/>
+          </a:xfrm>
+          <a:prstGeom prst="straightConnector1">
+            <a:avLst/>
+          </a:prstGeom>
+          <a:ln w="19050">
+            <a:solidFill>
+              <a:schemeClr val="accent1"/>
+            </a:solidFill>
+            <a:tailEnd type="triangle"/>
+          </a:ln>
+        </p:spPr>
+        <p:style>
+          <a:lnRef idx="1">
+            <a:schemeClr val="accent1"/>
+          </a:lnRef>
+          <a:fillRef idx="0">
+            <a:schemeClr val="accent1"/>
+          </a:fillRef>
+          <a:effectRef idx="0">
+            <a:schemeClr val="accent1"/>
+          </a:effectRef>
+          <a:fontRef idx="minor">
+            <a:schemeClr val="tx1"/>
+          </a:fontRef>
+        </p:style>
+      </p:cxnSp>
+      <p:sp>
+        <p:nvSpPr>
+          <p:cNvPr id="239" name="Oval 238">
+            <a:extLst>
+              <a:ext uri="{FF2B5EF4-FFF2-40B4-BE49-F238E27FC236}">
+                <a16:creationId xmlns:a16="http://schemas.microsoft.com/office/drawing/2014/main" id="{C91F58B4-1D1F-4674-9A71-D8095FE468B7}"/>
+              </a:ext>
+            </a:extLst>
+          </p:cNvPr>
+          <p:cNvSpPr/>
+          <p:nvPr/>
+        </p:nvSpPr>
+        <p:spPr>
+          <a:xfrm>
+            <a:off x="1503171" y="431005"/>
+            <a:ext cx="460559" cy="414338"/>
+          </a:xfrm>
+          <a:prstGeom prst="ellipse">
+            <a:avLst/>
+          </a:prstGeom>
+          <a:noFill/>
+        </p:spPr>
+        <p:style>
+          <a:lnRef idx="2">
+            <a:schemeClr val="accent1">
+              <a:shade val="50000"/>
+            </a:schemeClr>
+          </a:lnRef>
+          <a:fillRef idx="1">
+            <a:schemeClr val="accent1"/>
+          </a:fillRef>
+          <a:effectRef idx="0">
+            <a:schemeClr val="accent1"/>
+          </a:effectRef>
+          <a:fontRef idx="minor">
+            <a:schemeClr val="lt1"/>
+          </a:fontRef>
+        </p:style>
+        <p:txBody>
+          <a:bodyPr rtlCol="0" anchor="ctr"/>
+          <a:lstStyle/>
+          <a:p>
+            <a:pPr algn="ctr"/>
+            <a:r>
+              <a:rPr lang="en-US" dirty="0">
+                <a:solidFill>
+                  <a:schemeClr val="tx1"/>
+                </a:solidFill>
+              </a:rPr>
+              <a:t>O</a:t>
+            </a:r>
+          </a:p>
+        </p:txBody>
+      </p:sp>
+      <p:sp>
+        <p:nvSpPr>
+          <p:cNvPr id="240" name="Oval 239">
+            <a:extLst>
+              <a:ext uri="{FF2B5EF4-FFF2-40B4-BE49-F238E27FC236}">
+                <a16:creationId xmlns:a16="http://schemas.microsoft.com/office/drawing/2014/main" id="{6360D29D-09C6-406D-B92F-9E2707A1ECA4}"/>
+              </a:ext>
+            </a:extLst>
+          </p:cNvPr>
+          <p:cNvSpPr/>
+          <p:nvPr/>
+        </p:nvSpPr>
+        <p:spPr>
+          <a:xfrm>
+            <a:off x="518807" y="934373"/>
+            <a:ext cx="547688" cy="485775"/>
+          </a:xfrm>
+          <a:prstGeom prst="ellipse">
+            <a:avLst/>
+          </a:prstGeom>
+          <a:noFill/>
+        </p:spPr>
+        <p:style>
+          <a:lnRef idx="2">
+            <a:schemeClr val="accent1">
+              <a:shade val="50000"/>
+            </a:schemeClr>
+          </a:lnRef>
+          <a:fillRef idx="1">
+            <a:schemeClr val="accent1"/>
+          </a:fillRef>
+          <a:effectRef idx="0">
+            <a:schemeClr val="accent1"/>
+          </a:effectRef>
+          <a:fontRef idx="minor">
+            <a:schemeClr val="lt1"/>
+          </a:fontRef>
+        </p:style>
+        <p:txBody>
+          <a:bodyPr rtlCol="0" anchor="ctr"/>
+          <a:lstStyle/>
+          <a:p>
+            <a:pPr algn="ctr"/>
+            <a:r>
+              <a:rPr lang="en-US" dirty="0">
+                <a:solidFill>
+                  <a:schemeClr val="tx1"/>
+                </a:solidFill>
+              </a:rPr>
+              <a:t>h</a:t>
+            </a:r>
+            <a:r>
+              <a:rPr lang="en-US" baseline="-25000" dirty="0">
+                <a:solidFill>
+                  <a:schemeClr val="tx1"/>
+                </a:solidFill>
+              </a:rPr>
+              <a:t>1</a:t>
+            </a:r>
+          </a:p>
+        </p:txBody>
+      </p:sp>
+      <p:sp>
+        <p:nvSpPr>
+          <p:cNvPr id="242" name="Oval 241">
+            <a:extLst>
+              <a:ext uri="{FF2B5EF4-FFF2-40B4-BE49-F238E27FC236}">
+                <a16:creationId xmlns:a16="http://schemas.microsoft.com/office/drawing/2014/main" id="{EC90F3DF-50EA-4163-8F27-28AE496DE996}"/>
+              </a:ext>
+            </a:extLst>
+          </p:cNvPr>
+          <p:cNvSpPr/>
+          <p:nvPr/>
+        </p:nvSpPr>
+        <p:spPr>
+          <a:xfrm>
+            <a:off x="1035690" y="1564480"/>
+            <a:ext cx="547688" cy="485775"/>
+          </a:xfrm>
+          <a:prstGeom prst="ellipse">
+            <a:avLst/>
+          </a:prstGeom>
+          <a:noFill/>
+        </p:spPr>
+        <p:style>
+          <a:lnRef idx="2">
+            <a:schemeClr val="accent1">
+              <a:shade val="50000"/>
+            </a:schemeClr>
+          </a:lnRef>
+          <a:fillRef idx="1">
+            <a:schemeClr val="accent1"/>
+          </a:fillRef>
+          <a:effectRef idx="0">
+            <a:schemeClr val="accent1"/>
+          </a:effectRef>
+          <a:fontRef idx="minor">
+            <a:schemeClr val="lt1"/>
+          </a:fontRef>
+        </p:style>
+        <p:txBody>
+          <a:bodyPr rtlCol="0" anchor="ctr"/>
+          <a:lstStyle/>
+          <a:p>
+            <a:pPr algn="ctr"/>
+            <a:r>
+              <a:rPr lang="en-US" dirty="0">
+                <a:solidFill>
+                  <a:schemeClr val="tx1"/>
+                </a:solidFill>
+              </a:rPr>
+              <a:t>i</a:t>
+            </a:r>
+            <a:r>
+              <a:rPr lang="en-US" baseline="-25000" dirty="0">
+                <a:solidFill>
+                  <a:schemeClr val="tx1"/>
+                </a:solidFill>
+              </a:rPr>
+              <a:t>1</a:t>
+            </a:r>
+          </a:p>
+        </p:txBody>
+      </p:sp>
+      <p:sp>
+        <p:nvSpPr>
+          <p:cNvPr id="243" name="Oval 242">
+            <a:extLst>
+              <a:ext uri="{FF2B5EF4-FFF2-40B4-BE49-F238E27FC236}">
+                <a16:creationId xmlns:a16="http://schemas.microsoft.com/office/drawing/2014/main" id="{08243109-EE10-45B8-B6B2-DAC1BE34B05F}"/>
+              </a:ext>
+            </a:extLst>
+          </p:cNvPr>
+          <p:cNvSpPr/>
+          <p:nvPr/>
+        </p:nvSpPr>
+        <p:spPr>
+          <a:xfrm>
+            <a:off x="1884896" y="1564480"/>
+            <a:ext cx="547688" cy="485775"/>
+          </a:xfrm>
+          <a:prstGeom prst="ellipse">
+            <a:avLst/>
+          </a:prstGeom>
+          <a:noFill/>
+        </p:spPr>
+        <p:style>
+          <a:lnRef idx="2">
+            <a:schemeClr val="accent1">
+              <a:shade val="50000"/>
+            </a:schemeClr>
+          </a:lnRef>
+          <a:fillRef idx="1">
+            <a:schemeClr val="accent1"/>
+          </a:fillRef>
+          <a:effectRef idx="0">
+            <a:schemeClr val="accent1"/>
+          </a:effectRef>
+          <a:fontRef idx="minor">
+            <a:schemeClr val="lt1"/>
+          </a:fontRef>
+        </p:style>
+        <p:txBody>
+          <a:bodyPr rtlCol="0" anchor="ctr"/>
+          <a:lstStyle/>
+          <a:p>
+            <a:pPr algn="ctr"/>
+            <a:r>
+              <a:rPr lang="en-US" dirty="0">
+                <a:solidFill>
+                  <a:schemeClr val="tx1"/>
+                </a:solidFill>
+              </a:rPr>
+              <a:t>i</a:t>
+            </a:r>
+            <a:r>
+              <a:rPr lang="en-US" baseline="-25000" dirty="0">
+                <a:solidFill>
+                  <a:schemeClr val="tx1"/>
+                </a:solidFill>
+              </a:rPr>
+              <a:t>2</a:t>
+            </a:r>
+          </a:p>
+        </p:txBody>
+      </p:sp>
+      <p:cxnSp>
+        <p:nvCxnSpPr>
+          <p:cNvPr id="244" name="Straight Arrow Connector 243">
+            <a:extLst>
+              <a:ext uri="{FF2B5EF4-FFF2-40B4-BE49-F238E27FC236}">
+                <a16:creationId xmlns:a16="http://schemas.microsoft.com/office/drawing/2014/main" id="{F6FFA93D-C65B-4A69-8930-17FBDF13831C}"/>
+              </a:ext>
+            </a:extLst>
+          </p:cNvPr>
+          <p:cNvCxnSpPr>
+            <a:cxnSpLocks/>
+            <a:stCxn id="240" idx="7"/>
+            <a:endCxn id="239" idx="2"/>
+          </p:cNvCxnSpPr>
+          <p:nvPr/>
+        </p:nvCxnSpPr>
+        <p:spPr>
+          <a:xfrm flipV="1">
+            <a:off x="986288" y="638174"/>
+            <a:ext cx="516883" cy="367339"/>
+          </a:xfrm>
+          <a:prstGeom prst="straightConnector1">
+            <a:avLst/>
+          </a:prstGeom>
+          <a:ln w="19050">
+            <a:solidFill>
+              <a:schemeClr val="accent1"/>
+            </a:solidFill>
+            <a:tailEnd type="triangle"/>
+          </a:ln>
+        </p:spPr>
+        <p:style>
+          <a:lnRef idx="1">
+            <a:schemeClr val="accent1"/>
+          </a:lnRef>
+          <a:fillRef idx="0">
+            <a:schemeClr val="accent1"/>
+          </a:fillRef>
+          <a:effectRef idx="0">
+            <a:schemeClr val="accent1"/>
+          </a:effectRef>
+          <a:fontRef idx="minor">
+            <a:schemeClr val="tx1"/>
+          </a:fontRef>
+        </p:style>
+      </p:cxnSp>
+      <p:cxnSp>
+        <p:nvCxnSpPr>
+          <p:cNvPr id="246" name="Straight Arrow Connector 245">
+            <a:extLst>
+              <a:ext uri="{FF2B5EF4-FFF2-40B4-BE49-F238E27FC236}">
+                <a16:creationId xmlns:a16="http://schemas.microsoft.com/office/drawing/2014/main" id="{2ECC02B0-6489-47D7-85F1-98B09F0B6E00}"/>
+              </a:ext>
+            </a:extLst>
+          </p:cNvPr>
+          <p:cNvCxnSpPr>
+            <a:cxnSpLocks/>
+            <a:stCxn id="242" idx="0"/>
+            <a:endCxn id="240" idx="4"/>
+          </p:cNvCxnSpPr>
+          <p:nvPr/>
+        </p:nvCxnSpPr>
+        <p:spPr>
+          <a:xfrm flipH="1" flipV="1">
+            <a:off x="792651" y="1420148"/>
+            <a:ext cx="516883" cy="144332"/>
+          </a:xfrm>
+          <a:prstGeom prst="straightConnector1">
+            <a:avLst/>
+          </a:prstGeom>
+          <a:ln w="19050">
+            <a:solidFill>
+              <a:schemeClr val="accent1"/>
+            </a:solidFill>
+            <a:tailEnd type="triangle"/>
+          </a:ln>
+        </p:spPr>
+        <p:style>
+          <a:lnRef idx="1">
+            <a:schemeClr val="accent1"/>
+          </a:lnRef>
+          <a:fillRef idx="0">
+            <a:schemeClr val="accent1"/>
+          </a:fillRef>
+          <a:effectRef idx="0">
+            <a:schemeClr val="accent1"/>
+          </a:effectRef>
+          <a:fontRef idx="minor">
+            <a:schemeClr val="tx1"/>
+          </a:fontRef>
+        </p:style>
+      </p:cxnSp>
+      <p:cxnSp>
+        <p:nvCxnSpPr>
+          <p:cNvPr id="248" name="Straight Arrow Connector 247">
+            <a:extLst>
+              <a:ext uri="{FF2B5EF4-FFF2-40B4-BE49-F238E27FC236}">
+                <a16:creationId xmlns:a16="http://schemas.microsoft.com/office/drawing/2014/main" id="{48DE6567-6557-461B-B789-DE1EFCDFC92A}"/>
+              </a:ext>
+            </a:extLst>
+          </p:cNvPr>
+          <p:cNvCxnSpPr>
+            <a:cxnSpLocks/>
+            <a:stCxn id="243" idx="1"/>
+            <a:endCxn id="240" idx="5"/>
+          </p:cNvCxnSpPr>
+          <p:nvPr/>
+        </p:nvCxnSpPr>
+        <p:spPr>
+          <a:xfrm flipH="1" flipV="1">
+            <a:off x="986288" y="1349008"/>
+            <a:ext cx="978815" cy="286612"/>
+          </a:xfrm>
+          <a:prstGeom prst="straightConnector1">
+            <a:avLst/>
+          </a:prstGeom>
+          <a:ln w="19050">
+            <a:solidFill>
+              <a:schemeClr val="accent1"/>
+            </a:solidFill>
+            <a:tailEnd type="triangle"/>
+          </a:ln>
+        </p:spPr>
+        <p:style>
+          <a:lnRef idx="1">
+            <a:schemeClr val="accent1"/>
+          </a:lnRef>
+          <a:fillRef idx="0">
+            <a:schemeClr val="accent1"/>
+          </a:fillRef>
+          <a:effectRef idx="0">
+            <a:schemeClr val="accent1"/>
+          </a:effectRef>
+          <a:fontRef idx="minor">
+            <a:schemeClr val="tx1"/>
+          </a:fontRef>
+        </p:style>
+      </p:cxnSp>
+      <p:sp>
+        <p:nvSpPr>
+          <p:cNvPr id="152" name="Oval 151">
+            <a:extLst>
+              <a:ext uri="{FF2B5EF4-FFF2-40B4-BE49-F238E27FC236}">
+                <a16:creationId xmlns:a16="http://schemas.microsoft.com/office/drawing/2014/main" id="{CDAAEA0A-09D5-4A94-BD3C-02C712CE915A}"/>
+              </a:ext>
+            </a:extLst>
+          </p:cNvPr>
+          <p:cNvSpPr/>
+          <p:nvPr/>
+        </p:nvSpPr>
+        <p:spPr>
+          <a:xfrm>
+            <a:off x="6628825" y="2759109"/>
+            <a:ext cx="460559" cy="414338"/>
+          </a:xfrm>
+          <a:prstGeom prst="ellipse">
+            <a:avLst/>
+          </a:prstGeom>
+          <a:noFill/>
+        </p:spPr>
+        <p:style>
+          <a:lnRef idx="2">
+            <a:schemeClr val="accent1">
+              <a:shade val="50000"/>
+            </a:schemeClr>
+          </a:lnRef>
+          <a:fillRef idx="1">
+            <a:schemeClr val="accent1"/>
+          </a:fillRef>
+          <a:effectRef idx="0">
+            <a:schemeClr val="accent1"/>
+          </a:effectRef>
+          <a:fontRef idx="minor">
+            <a:schemeClr val="lt1"/>
+          </a:fontRef>
+        </p:style>
+        <p:txBody>
+          <a:bodyPr rtlCol="0" anchor="ctr"/>
+          <a:lstStyle/>
+          <a:p>
+            <a:pPr algn="ctr"/>
+            <a:r>
+              <a:rPr lang="en-US" dirty="0">
+                <a:solidFill>
+                  <a:schemeClr val="tx1"/>
+                </a:solidFill>
+              </a:rPr>
+              <a:t>O</a:t>
+            </a:r>
+          </a:p>
+        </p:txBody>
+      </p:sp>
+      <p:sp>
+        <p:nvSpPr>
+          <p:cNvPr id="153" name="Oval 152">
+            <a:extLst>
+              <a:ext uri="{FF2B5EF4-FFF2-40B4-BE49-F238E27FC236}">
+                <a16:creationId xmlns:a16="http://schemas.microsoft.com/office/drawing/2014/main" id="{E0A255E9-E88B-42D6-8949-4C687622456E}"/>
+              </a:ext>
+            </a:extLst>
+          </p:cNvPr>
+          <p:cNvSpPr/>
+          <p:nvPr/>
+        </p:nvSpPr>
+        <p:spPr>
+          <a:xfrm>
+            <a:off x="5644461" y="3262477"/>
+            <a:ext cx="547688" cy="485775"/>
+          </a:xfrm>
+          <a:prstGeom prst="ellipse">
+            <a:avLst/>
+          </a:prstGeom>
+          <a:noFill/>
+        </p:spPr>
+        <p:style>
+          <a:lnRef idx="2">
+            <a:schemeClr val="accent1">
+              <a:shade val="50000"/>
+            </a:schemeClr>
+          </a:lnRef>
+          <a:fillRef idx="1">
+            <a:schemeClr val="accent1"/>
+          </a:fillRef>
+          <a:effectRef idx="0">
+            <a:schemeClr val="accent1"/>
+          </a:effectRef>
+          <a:fontRef idx="minor">
+            <a:schemeClr val="lt1"/>
+          </a:fontRef>
+        </p:style>
+        <p:txBody>
+          <a:bodyPr rtlCol="0" anchor="ctr"/>
+          <a:lstStyle/>
+          <a:p>
+            <a:pPr algn="ctr"/>
+            <a:r>
+              <a:rPr lang="en-US" dirty="0">
+                <a:solidFill>
+                  <a:schemeClr val="tx1"/>
+                </a:solidFill>
+              </a:rPr>
+              <a:t>h</a:t>
+            </a:r>
+            <a:r>
+              <a:rPr lang="en-US" baseline="-25000" dirty="0">
+                <a:solidFill>
+                  <a:schemeClr val="tx1"/>
+                </a:solidFill>
+              </a:rPr>
+              <a:t>1</a:t>
+            </a:r>
+          </a:p>
+        </p:txBody>
+      </p:sp>
+      <p:sp>
+        <p:nvSpPr>
+          <p:cNvPr id="155" name="Oval 154">
+            <a:extLst>
+              <a:ext uri="{FF2B5EF4-FFF2-40B4-BE49-F238E27FC236}">
+                <a16:creationId xmlns:a16="http://schemas.microsoft.com/office/drawing/2014/main" id="{4114E764-B524-4DCB-BD9E-796CF5B302D5}"/>
+              </a:ext>
+            </a:extLst>
+          </p:cNvPr>
+          <p:cNvSpPr/>
+          <p:nvPr/>
+        </p:nvSpPr>
+        <p:spPr>
+          <a:xfrm>
+            <a:off x="6161344" y="3892584"/>
+            <a:ext cx="547688" cy="485775"/>
+          </a:xfrm>
+          <a:prstGeom prst="ellipse">
+            <a:avLst/>
+          </a:prstGeom>
+          <a:noFill/>
+        </p:spPr>
+        <p:style>
+          <a:lnRef idx="2">
+            <a:schemeClr val="accent1">
+              <a:shade val="50000"/>
+            </a:schemeClr>
+          </a:lnRef>
+          <a:fillRef idx="1">
+            <a:schemeClr val="accent1"/>
+          </a:fillRef>
+          <a:effectRef idx="0">
+            <a:schemeClr val="accent1"/>
+          </a:effectRef>
+          <a:fontRef idx="minor">
+            <a:schemeClr val="lt1"/>
+          </a:fontRef>
+        </p:style>
+        <p:txBody>
+          <a:bodyPr rtlCol="0" anchor="ctr"/>
+          <a:lstStyle/>
+          <a:p>
+            <a:pPr algn="ctr"/>
+            <a:r>
+              <a:rPr lang="en-US" dirty="0">
+                <a:solidFill>
+                  <a:schemeClr val="tx1"/>
+                </a:solidFill>
+              </a:rPr>
+              <a:t>i</a:t>
+            </a:r>
+            <a:r>
+              <a:rPr lang="en-US" baseline="-25000" dirty="0">
+                <a:solidFill>
+                  <a:schemeClr val="tx1"/>
+                </a:solidFill>
+              </a:rPr>
+              <a:t>1</a:t>
+            </a:r>
+          </a:p>
+        </p:txBody>
+      </p:sp>
+      <p:sp>
+        <p:nvSpPr>
+          <p:cNvPr id="156" name="Oval 155">
+            <a:extLst>
+              <a:ext uri="{FF2B5EF4-FFF2-40B4-BE49-F238E27FC236}">
+                <a16:creationId xmlns:a16="http://schemas.microsoft.com/office/drawing/2014/main" id="{D15E6E97-39E9-472A-9613-67C20B4CA1FA}"/>
+              </a:ext>
+            </a:extLst>
+          </p:cNvPr>
+          <p:cNvSpPr/>
+          <p:nvPr/>
+        </p:nvSpPr>
+        <p:spPr>
+          <a:xfrm>
+            <a:off x="7010550" y="3892584"/>
+            <a:ext cx="547688" cy="485775"/>
+          </a:xfrm>
+          <a:prstGeom prst="ellipse">
+            <a:avLst/>
+          </a:prstGeom>
+          <a:noFill/>
+        </p:spPr>
+        <p:style>
+          <a:lnRef idx="2">
+            <a:schemeClr val="accent1">
+              <a:shade val="50000"/>
+            </a:schemeClr>
+          </a:lnRef>
+          <a:fillRef idx="1">
+            <a:schemeClr val="accent1"/>
+          </a:fillRef>
+          <a:effectRef idx="0">
+            <a:schemeClr val="accent1"/>
+          </a:effectRef>
+          <a:fontRef idx="minor">
+            <a:schemeClr val="lt1"/>
+          </a:fontRef>
+        </p:style>
+        <p:txBody>
+          <a:bodyPr rtlCol="0" anchor="ctr"/>
+          <a:lstStyle/>
+          <a:p>
+            <a:pPr algn="ctr"/>
+            <a:r>
+              <a:rPr lang="en-US" dirty="0">
+                <a:solidFill>
+                  <a:schemeClr val="tx1"/>
+                </a:solidFill>
+              </a:rPr>
+              <a:t>i</a:t>
+            </a:r>
+            <a:r>
+              <a:rPr lang="en-US" baseline="-25000" dirty="0">
+                <a:solidFill>
+                  <a:schemeClr val="tx1"/>
+                </a:solidFill>
+              </a:rPr>
+              <a:t>2</a:t>
+            </a:r>
+          </a:p>
+        </p:txBody>
+      </p:sp>
+      <p:cxnSp>
+        <p:nvCxnSpPr>
+          <p:cNvPr id="157" name="Straight Arrow Connector 156">
+            <a:extLst>
+              <a:ext uri="{FF2B5EF4-FFF2-40B4-BE49-F238E27FC236}">
+                <a16:creationId xmlns:a16="http://schemas.microsoft.com/office/drawing/2014/main" id="{0F4C72BA-8867-4063-96BD-2951EF91D70D}"/>
+              </a:ext>
+            </a:extLst>
+          </p:cNvPr>
+          <p:cNvCxnSpPr>
+            <a:cxnSpLocks/>
+            <a:stCxn id="153" idx="7"/>
+            <a:endCxn id="152" idx="2"/>
+          </p:cNvCxnSpPr>
+          <p:nvPr/>
+        </p:nvCxnSpPr>
+        <p:spPr>
+          <a:xfrm flipV="1">
+            <a:off x="6111942" y="2966278"/>
+            <a:ext cx="516883" cy="367339"/>
+          </a:xfrm>
+          <a:prstGeom prst="straightConnector1">
+            <a:avLst/>
+          </a:prstGeom>
+          <a:ln w="19050">
+            <a:solidFill>
+              <a:schemeClr val="accent1"/>
+            </a:solidFill>
+            <a:tailEnd type="triangle"/>
+          </a:ln>
+        </p:spPr>
+        <p:style>
+          <a:lnRef idx="1">
+            <a:schemeClr val="accent1"/>
+          </a:lnRef>
+          <a:fillRef idx="0">
+            <a:schemeClr val="accent1"/>
+          </a:fillRef>
+          <a:effectRef idx="0">
+            <a:schemeClr val="accent1"/>
+          </a:effectRef>
+          <a:fontRef idx="minor">
+            <a:schemeClr val="tx1"/>
+          </a:fontRef>
+        </p:style>
+      </p:cxnSp>
+      <p:cxnSp>
+        <p:nvCxnSpPr>
+          <p:cNvPr id="159" name="Straight Arrow Connector 158">
+            <a:extLst>
+              <a:ext uri="{FF2B5EF4-FFF2-40B4-BE49-F238E27FC236}">
+                <a16:creationId xmlns:a16="http://schemas.microsoft.com/office/drawing/2014/main" id="{68450BD2-BFCD-4896-B842-3D5A29F651E3}"/>
+              </a:ext>
+            </a:extLst>
+          </p:cNvPr>
+          <p:cNvCxnSpPr>
+            <a:cxnSpLocks/>
+            <a:stCxn id="155" idx="0"/>
+            <a:endCxn id="153" idx="4"/>
+          </p:cNvCxnSpPr>
+          <p:nvPr/>
+        </p:nvCxnSpPr>
+        <p:spPr>
+          <a:xfrm flipH="1" flipV="1">
+            <a:off x="5918305" y="3748252"/>
+            <a:ext cx="516883" cy="144332"/>
+          </a:xfrm>
+          <a:prstGeom prst="straightConnector1">
+            <a:avLst/>
+          </a:prstGeom>
+          <a:ln w="19050">
+            <a:solidFill>
+              <a:schemeClr val="accent1"/>
+            </a:solidFill>
+            <a:tailEnd type="triangle"/>
+          </a:ln>
+        </p:spPr>
+        <p:style>
+          <a:lnRef idx="1">
+            <a:schemeClr val="accent1"/>
+          </a:lnRef>
+          <a:fillRef idx="0">
+            <a:schemeClr val="accent1"/>
+          </a:fillRef>
+          <a:effectRef idx="0">
+            <a:schemeClr val="accent1"/>
+          </a:effectRef>
+          <a:fontRef idx="minor">
+            <a:schemeClr val="tx1"/>
+          </a:fontRef>
+        </p:style>
+      </p:cxnSp>
+      <p:cxnSp>
+        <p:nvCxnSpPr>
+          <p:cNvPr id="161" name="Straight Arrow Connector 160">
+            <a:extLst>
+              <a:ext uri="{FF2B5EF4-FFF2-40B4-BE49-F238E27FC236}">
+                <a16:creationId xmlns:a16="http://schemas.microsoft.com/office/drawing/2014/main" id="{9482AEDC-DF27-4CCE-AC06-54F85A279BFB}"/>
+              </a:ext>
+            </a:extLst>
+          </p:cNvPr>
+          <p:cNvCxnSpPr>
+            <a:cxnSpLocks/>
+            <a:stCxn id="156" idx="1"/>
+            <a:endCxn id="153" idx="5"/>
+          </p:cNvCxnSpPr>
+          <p:nvPr/>
+        </p:nvCxnSpPr>
+        <p:spPr>
+          <a:xfrm flipH="1" flipV="1">
+            <a:off x="6111942" y="3677112"/>
+            <a:ext cx="978815" cy="286612"/>
+          </a:xfrm>
+          <a:prstGeom prst="straightConnector1">
+            <a:avLst/>
+          </a:prstGeom>
+          <a:ln w="19050">
+            <a:solidFill>
+              <a:schemeClr val="accent1"/>
+            </a:solidFill>
+            <a:tailEnd type="triangle"/>
+          </a:ln>
+        </p:spPr>
+        <p:style>
+          <a:lnRef idx="1">
+            <a:schemeClr val="accent1"/>
+          </a:lnRef>
+          <a:fillRef idx="0">
+            <a:schemeClr val="accent1"/>
+          </a:fillRef>
+          <a:effectRef idx="0">
+            <a:schemeClr val="accent1"/>
+          </a:effectRef>
+          <a:fontRef idx="minor">
+            <a:schemeClr val="tx1"/>
+          </a:fontRef>
+        </p:style>
+      </p:cxnSp>
+      <p:sp>
+        <p:nvSpPr>
+          <p:cNvPr id="163" name="Oval 162">
+            <a:extLst>
+              <a:ext uri="{FF2B5EF4-FFF2-40B4-BE49-F238E27FC236}">
+                <a16:creationId xmlns:a16="http://schemas.microsoft.com/office/drawing/2014/main" id="{500A1293-735F-4142-9E28-7058E4C35211}"/>
+              </a:ext>
+            </a:extLst>
+          </p:cNvPr>
+          <p:cNvSpPr/>
+          <p:nvPr/>
+        </p:nvSpPr>
+        <p:spPr>
+          <a:xfrm>
+            <a:off x="6924765" y="3245501"/>
+            <a:ext cx="547688" cy="485775"/>
+          </a:xfrm>
+          <a:prstGeom prst="ellipse">
+            <a:avLst/>
+          </a:prstGeom>
+          <a:noFill/>
+        </p:spPr>
+        <p:style>
+          <a:lnRef idx="2">
+            <a:schemeClr val="accent1">
+              <a:shade val="50000"/>
+            </a:schemeClr>
+          </a:lnRef>
+          <a:fillRef idx="1">
+            <a:schemeClr val="accent1"/>
+          </a:fillRef>
+          <a:effectRef idx="0">
+            <a:schemeClr val="accent1"/>
+          </a:effectRef>
+          <a:fontRef idx="minor">
+            <a:schemeClr val="lt1"/>
+          </a:fontRef>
+        </p:style>
+        <p:txBody>
+          <a:bodyPr rtlCol="0" anchor="ctr"/>
+          <a:lstStyle/>
+          <a:p>
+            <a:pPr algn="ctr"/>
+            <a:r>
+              <a:rPr lang="en-US" dirty="0">
+                <a:solidFill>
+                  <a:schemeClr val="tx1"/>
+                </a:solidFill>
+              </a:rPr>
+              <a:t>h</a:t>
+            </a:r>
+            <a:r>
+              <a:rPr lang="en-US" baseline="-25000" dirty="0">
+                <a:solidFill>
+                  <a:schemeClr val="tx1"/>
+                </a:solidFill>
+              </a:rPr>
+              <a:t>3</a:t>
+            </a:r>
+          </a:p>
+        </p:txBody>
+      </p:sp>
+      <p:sp>
+        <p:nvSpPr>
+          <p:cNvPr id="164" name="Oval 163">
+            <a:extLst>
+              <a:ext uri="{FF2B5EF4-FFF2-40B4-BE49-F238E27FC236}">
+                <a16:creationId xmlns:a16="http://schemas.microsoft.com/office/drawing/2014/main" id="{71C41301-4B68-4CCA-A71B-B7482875A5F0}"/>
+              </a:ext>
+            </a:extLst>
+          </p:cNvPr>
+          <p:cNvSpPr/>
+          <p:nvPr/>
+        </p:nvSpPr>
+        <p:spPr>
+          <a:xfrm>
+            <a:off x="7578961" y="3277603"/>
+            <a:ext cx="547688" cy="485775"/>
+          </a:xfrm>
+          <a:prstGeom prst="ellipse">
+            <a:avLst/>
+          </a:prstGeom>
+          <a:noFill/>
+        </p:spPr>
+        <p:style>
+          <a:lnRef idx="2">
+            <a:schemeClr val="accent1">
+              <a:shade val="50000"/>
+            </a:schemeClr>
+          </a:lnRef>
+          <a:fillRef idx="1">
+            <a:schemeClr val="accent1"/>
+          </a:fillRef>
+          <a:effectRef idx="0">
+            <a:schemeClr val="accent1"/>
+          </a:effectRef>
+          <a:fontRef idx="minor">
+            <a:schemeClr val="lt1"/>
+          </a:fontRef>
+        </p:style>
+        <p:txBody>
+          <a:bodyPr rtlCol="0" anchor="ctr"/>
+          <a:lstStyle/>
+          <a:p>
+            <a:pPr algn="ctr"/>
+            <a:r>
+              <a:rPr lang="en-US" dirty="0">
+                <a:solidFill>
+                  <a:schemeClr val="tx1"/>
+                </a:solidFill>
+              </a:rPr>
+              <a:t>h</a:t>
+            </a:r>
+            <a:r>
+              <a:rPr lang="en-US" baseline="-25000" dirty="0">
+                <a:solidFill>
+                  <a:schemeClr val="tx1"/>
+                </a:solidFill>
+              </a:rPr>
+              <a:t>4</a:t>
+            </a:r>
+          </a:p>
+        </p:txBody>
+      </p:sp>
+      <p:cxnSp>
+        <p:nvCxnSpPr>
+          <p:cNvPr id="165" name="Straight Arrow Connector 164">
+            <a:extLst>
+              <a:ext uri="{FF2B5EF4-FFF2-40B4-BE49-F238E27FC236}">
+                <a16:creationId xmlns:a16="http://schemas.microsoft.com/office/drawing/2014/main" id="{C42244DD-8720-4B2A-9B22-76E2C8786CB2}"/>
+              </a:ext>
+            </a:extLst>
+          </p:cNvPr>
+          <p:cNvCxnSpPr>
+            <a:cxnSpLocks/>
+            <a:stCxn id="163" idx="0"/>
+            <a:endCxn id="152" idx="5"/>
+          </p:cNvCxnSpPr>
+          <p:nvPr/>
+        </p:nvCxnSpPr>
+        <p:spPr>
+          <a:xfrm flipH="1" flipV="1">
+            <a:off x="7021937" y="3112769"/>
+            <a:ext cx="176672" cy="132732"/>
+          </a:xfrm>
+          <a:prstGeom prst="straightConnector1">
+            <a:avLst/>
+          </a:prstGeom>
+          <a:ln w="19050">
+            <a:solidFill>
+              <a:schemeClr val="accent1"/>
+            </a:solidFill>
+            <a:tailEnd type="triangle"/>
+          </a:ln>
+        </p:spPr>
+        <p:style>
+          <a:lnRef idx="1">
+            <a:schemeClr val="accent1"/>
+          </a:lnRef>
+          <a:fillRef idx="0">
+            <a:schemeClr val="accent1"/>
+          </a:fillRef>
+          <a:effectRef idx="0">
+            <a:schemeClr val="accent1"/>
+          </a:effectRef>
+          <a:fontRef idx="minor">
+            <a:schemeClr val="tx1"/>
+          </a:fontRef>
+        </p:style>
+      </p:cxnSp>
+      <p:cxnSp>
+        <p:nvCxnSpPr>
+          <p:cNvPr id="166" name="Straight Arrow Connector 165">
+            <a:extLst>
+              <a:ext uri="{FF2B5EF4-FFF2-40B4-BE49-F238E27FC236}">
+                <a16:creationId xmlns:a16="http://schemas.microsoft.com/office/drawing/2014/main" id="{294B2E76-C3B5-412C-A51B-468EB2C1F0A2}"/>
+              </a:ext>
+            </a:extLst>
+          </p:cNvPr>
+          <p:cNvCxnSpPr>
+            <a:cxnSpLocks/>
+            <a:stCxn id="164" idx="1"/>
+            <a:endCxn id="152" idx="6"/>
+          </p:cNvCxnSpPr>
+          <p:nvPr/>
+        </p:nvCxnSpPr>
+        <p:spPr>
+          <a:xfrm flipH="1" flipV="1">
+            <a:off x="7089384" y="2966278"/>
+            <a:ext cx="569784" cy="382465"/>
+          </a:xfrm>
+          <a:prstGeom prst="straightConnector1">
+            <a:avLst/>
+          </a:prstGeom>
+          <a:ln w="19050">
+            <a:solidFill>
+              <a:schemeClr val="accent1"/>
+            </a:solidFill>
+            <a:tailEnd type="triangle"/>
+          </a:ln>
+        </p:spPr>
+        <p:style>
+          <a:lnRef idx="1">
+            <a:schemeClr val="accent1"/>
+          </a:lnRef>
+          <a:fillRef idx="0">
+            <a:schemeClr val="accent1"/>
+          </a:fillRef>
+          <a:effectRef idx="0">
+            <a:schemeClr val="accent1"/>
+          </a:effectRef>
+          <a:fontRef idx="minor">
+            <a:schemeClr val="tx1"/>
+          </a:fontRef>
+        </p:style>
+      </p:cxnSp>
+      <p:cxnSp>
+        <p:nvCxnSpPr>
+          <p:cNvPr id="167" name="Straight Arrow Connector 166">
+            <a:extLst>
+              <a:ext uri="{FF2B5EF4-FFF2-40B4-BE49-F238E27FC236}">
+                <a16:creationId xmlns:a16="http://schemas.microsoft.com/office/drawing/2014/main" id="{4EA3CA79-F5CB-424B-A783-51601DACE8A5}"/>
+              </a:ext>
+            </a:extLst>
+          </p:cNvPr>
+          <p:cNvCxnSpPr>
+            <a:cxnSpLocks/>
+            <a:stCxn id="155" idx="7"/>
+            <a:endCxn id="163" idx="3"/>
+          </p:cNvCxnSpPr>
+          <p:nvPr/>
+        </p:nvCxnSpPr>
+        <p:spPr>
+          <a:xfrm flipV="1">
+            <a:off x="6628825" y="3660136"/>
+            <a:ext cx="376147" cy="303588"/>
+          </a:xfrm>
+          <a:prstGeom prst="straightConnector1">
+            <a:avLst/>
+          </a:prstGeom>
+          <a:ln w="19050">
+            <a:solidFill>
+              <a:schemeClr val="accent1"/>
+            </a:solidFill>
+            <a:tailEnd type="triangle"/>
+          </a:ln>
+        </p:spPr>
+        <p:style>
+          <a:lnRef idx="1">
+            <a:schemeClr val="accent1"/>
+          </a:lnRef>
+          <a:fillRef idx="0">
+            <a:schemeClr val="accent1"/>
+          </a:fillRef>
+          <a:effectRef idx="0">
+            <a:schemeClr val="accent1"/>
+          </a:effectRef>
+          <a:fontRef idx="minor">
+            <a:schemeClr val="tx1"/>
+          </a:fontRef>
+        </p:style>
+      </p:cxnSp>
+      <p:cxnSp>
+        <p:nvCxnSpPr>
+          <p:cNvPr id="168" name="Straight Arrow Connector 167">
+            <a:extLst>
+              <a:ext uri="{FF2B5EF4-FFF2-40B4-BE49-F238E27FC236}">
+                <a16:creationId xmlns:a16="http://schemas.microsoft.com/office/drawing/2014/main" id="{8D444AF5-A237-4DCD-8EB8-176A4A5FCCB0}"/>
+              </a:ext>
+            </a:extLst>
+          </p:cNvPr>
+          <p:cNvCxnSpPr>
+            <a:cxnSpLocks/>
+            <a:stCxn id="156" idx="7"/>
+            <a:endCxn id="164" idx="4"/>
+          </p:cNvCxnSpPr>
+          <p:nvPr/>
+        </p:nvCxnSpPr>
+        <p:spPr>
+          <a:xfrm flipV="1">
+            <a:off x="7478031" y="3763378"/>
+            <a:ext cx="374774" cy="200346"/>
+          </a:xfrm>
+          <a:prstGeom prst="straightConnector1">
+            <a:avLst/>
+          </a:prstGeom>
+          <a:ln w="19050">
+            <a:solidFill>
+              <a:schemeClr val="accent1"/>
+            </a:solidFill>
+            <a:tailEnd type="triangle"/>
+          </a:ln>
+        </p:spPr>
+        <p:style>
+          <a:lnRef idx="1">
+            <a:schemeClr val="accent1"/>
+          </a:lnRef>
+          <a:fillRef idx="0">
+            <a:schemeClr val="accent1"/>
+          </a:fillRef>
+          <a:effectRef idx="0">
+            <a:schemeClr val="accent1"/>
+          </a:effectRef>
+          <a:fontRef idx="minor">
+            <a:schemeClr val="tx1"/>
+          </a:fontRef>
+        </p:style>
+      </p:cxnSp>
+      <p:cxnSp>
+        <p:nvCxnSpPr>
+          <p:cNvPr id="169" name="Straight Arrow Connector 168">
+            <a:extLst>
+              <a:ext uri="{FF2B5EF4-FFF2-40B4-BE49-F238E27FC236}">
+                <a16:creationId xmlns:a16="http://schemas.microsoft.com/office/drawing/2014/main" id="{5978F987-6CC9-4F39-B3D0-CD0B690F2E3A}"/>
+              </a:ext>
+            </a:extLst>
+          </p:cNvPr>
+          <p:cNvCxnSpPr>
+            <a:cxnSpLocks/>
+            <a:stCxn id="156" idx="0"/>
+            <a:endCxn id="163" idx="4"/>
+          </p:cNvCxnSpPr>
+          <p:nvPr/>
+        </p:nvCxnSpPr>
+        <p:spPr>
+          <a:xfrm flipH="1" flipV="1">
+            <a:off x="7198609" y="3731276"/>
+            <a:ext cx="85785" cy="161308"/>
+          </a:xfrm>
+          <a:prstGeom prst="straightConnector1">
+            <a:avLst/>
+          </a:prstGeom>
+          <a:ln w="19050">
+            <a:solidFill>
+              <a:schemeClr val="accent1"/>
+            </a:solidFill>
+            <a:tailEnd type="triangle"/>
+          </a:ln>
+        </p:spPr>
+        <p:style>
+          <a:lnRef idx="1">
+            <a:schemeClr val="accent1"/>
+          </a:lnRef>
+          <a:fillRef idx="0">
+            <a:schemeClr val="accent1"/>
+          </a:fillRef>
+          <a:effectRef idx="0">
+            <a:schemeClr val="accent1"/>
+          </a:effectRef>
+          <a:fontRef idx="minor">
+            <a:schemeClr val="tx1"/>
+          </a:fontRef>
+        </p:style>
+      </p:cxnSp>
+      <p:cxnSp>
+        <p:nvCxnSpPr>
+          <p:cNvPr id="170" name="Straight Arrow Connector 169">
+            <a:extLst>
+              <a:ext uri="{FF2B5EF4-FFF2-40B4-BE49-F238E27FC236}">
+                <a16:creationId xmlns:a16="http://schemas.microsoft.com/office/drawing/2014/main" id="{3368205E-AE7A-4554-B65B-E8030FEB7C0E}"/>
+              </a:ext>
+            </a:extLst>
+          </p:cNvPr>
+          <p:cNvCxnSpPr>
+            <a:cxnSpLocks/>
+            <a:stCxn id="155" idx="7"/>
+            <a:endCxn id="164" idx="3"/>
+          </p:cNvCxnSpPr>
+          <p:nvPr/>
+        </p:nvCxnSpPr>
+        <p:spPr>
+          <a:xfrm flipV="1">
+            <a:off x="6628825" y="3692238"/>
+            <a:ext cx="1030343" cy="271486"/>
+          </a:xfrm>
+          <a:prstGeom prst="straightConnector1">
+            <a:avLst/>
+          </a:prstGeom>
+          <a:ln w="19050">
+            <a:solidFill>
+              <a:schemeClr val="accent1"/>
+            </a:solidFill>
+            <a:tailEnd type="triangle"/>
+          </a:ln>
+        </p:spPr>
+        <p:style>
+          <a:lnRef idx="1">
+            <a:schemeClr val="accent1"/>
+          </a:lnRef>
+          <a:fillRef idx="0">
+            <a:schemeClr val="accent1"/>
+          </a:fillRef>
+          <a:effectRef idx="0">
+            <a:schemeClr val="accent1"/>
+          </a:effectRef>
+          <a:fontRef idx="minor">
+            <a:schemeClr val="tx1"/>
+          </a:fontRef>
+        </p:style>
+      </p:cxnSp>
+      <p:sp>
+        <p:nvSpPr>
+          <p:cNvPr id="171" name="Oval 170">
+            <a:extLst>
+              <a:ext uri="{FF2B5EF4-FFF2-40B4-BE49-F238E27FC236}">
+                <a16:creationId xmlns:a16="http://schemas.microsoft.com/office/drawing/2014/main" id="{63FA8938-8FE6-45B2-9C7C-261C5BFAAF11}"/>
+              </a:ext>
+            </a:extLst>
+          </p:cNvPr>
+          <p:cNvSpPr/>
+          <p:nvPr/>
+        </p:nvSpPr>
+        <p:spPr>
+          <a:xfrm>
+            <a:off x="3051575" y="4745422"/>
+            <a:ext cx="460559" cy="414338"/>
+          </a:xfrm>
+          <a:prstGeom prst="ellipse">
+            <a:avLst/>
+          </a:prstGeom>
+          <a:noFill/>
+        </p:spPr>
+        <p:style>
+          <a:lnRef idx="2">
+            <a:schemeClr val="accent1">
+              <a:shade val="50000"/>
+            </a:schemeClr>
+          </a:lnRef>
+          <a:fillRef idx="1">
+            <a:schemeClr val="accent1"/>
+          </a:fillRef>
+          <a:effectRef idx="0">
+            <a:schemeClr val="accent1"/>
+          </a:effectRef>
+          <a:fontRef idx="minor">
+            <a:schemeClr val="lt1"/>
+          </a:fontRef>
+        </p:style>
+        <p:txBody>
+          <a:bodyPr rtlCol="0" anchor="ctr"/>
+          <a:lstStyle/>
+          <a:p>
+            <a:pPr algn="ctr"/>
+            <a:r>
+              <a:rPr lang="en-US" dirty="0">
+                <a:solidFill>
+                  <a:schemeClr val="tx1"/>
+                </a:solidFill>
+              </a:rPr>
+              <a:t>O</a:t>
+            </a:r>
+          </a:p>
+        </p:txBody>
+      </p:sp>
+      <p:sp>
+        <p:nvSpPr>
+          <p:cNvPr id="172" name="Oval 171">
+            <a:extLst>
+              <a:ext uri="{FF2B5EF4-FFF2-40B4-BE49-F238E27FC236}">
+                <a16:creationId xmlns:a16="http://schemas.microsoft.com/office/drawing/2014/main" id="{79ADF33A-A275-423C-84C8-81CD698C9762}"/>
+              </a:ext>
+            </a:extLst>
+          </p:cNvPr>
+          <p:cNvSpPr/>
+          <p:nvPr/>
+        </p:nvSpPr>
+        <p:spPr>
+          <a:xfrm>
+            <a:off x="2067211" y="5248790"/>
+            <a:ext cx="547688" cy="485775"/>
+          </a:xfrm>
+          <a:prstGeom prst="ellipse">
+            <a:avLst/>
+          </a:prstGeom>
+          <a:noFill/>
+        </p:spPr>
+        <p:style>
+          <a:lnRef idx="2">
+            <a:schemeClr val="accent1">
+              <a:shade val="50000"/>
+            </a:schemeClr>
+          </a:lnRef>
+          <a:fillRef idx="1">
+            <a:schemeClr val="accent1"/>
+          </a:fillRef>
+          <a:effectRef idx="0">
+            <a:schemeClr val="accent1"/>
+          </a:effectRef>
+          <a:fontRef idx="minor">
+            <a:schemeClr val="lt1"/>
+          </a:fontRef>
+        </p:style>
+        <p:txBody>
+          <a:bodyPr rtlCol="0" anchor="ctr"/>
+          <a:lstStyle/>
+          <a:p>
+            <a:pPr algn="ctr"/>
+            <a:r>
+              <a:rPr lang="en-US" dirty="0">
+                <a:solidFill>
+                  <a:schemeClr val="tx1"/>
+                </a:solidFill>
+              </a:rPr>
+              <a:t>h</a:t>
+            </a:r>
+            <a:r>
+              <a:rPr lang="en-US" baseline="-25000" dirty="0">
+                <a:solidFill>
+                  <a:schemeClr val="tx1"/>
+                </a:solidFill>
+              </a:rPr>
+              <a:t>1</a:t>
+            </a:r>
+          </a:p>
+        </p:txBody>
+      </p:sp>
+      <p:sp>
+        <p:nvSpPr>
+          <p:cNvPr id="173" name="Oval 172">
+            <a:extLst>
+              <a:ext uri="{FF2B5EF4-FFF2-40B4-BE49-F238E27FC236}">
+                <a16:creationId xmlns:a16="http://schemas.microsoft.com/office/drawing/2014/main" id="{64AA7488-0375-4197-B001-530DFE202A80}"/>
+              </a:ext>
+            </a:extLst>
+          </p:cNvPr>
+          <p:cNvSpPr/>
+          <p:nvPr/>
+        </p:nvSpPr>
+        <p:spPr>
+          <a:xfrm>
+            <a:off x="2693319" y="5249927"/>
+            <a:ext cx="547688" cy="485775"/>
+          </a:xfrm>
+          <a:prstGeom prst="ellipse">
+            <a:avLst/>
+          </a:prstGeom>
+          <a:noFill/>
+        </p:spPr>
+        <p:style>
+          <a:lnRef idx="2">
+            <a:schemeClr val="accent1">
+              <a:shade val="50000"/>
+            </a:schemeClr>
+          </a:lnRef>
+          <a:fillRef idx="1">
+            <a:schemeClr val="accent1"/>
+          </a:fillRef>
+          <a:effectRef idx="0">
+            <a:schemeClr val="accent1"/>
+          </a:effectRef>
+          <a:fontRef idx="minor">
+            <a:schemeClr val="lt1"/>
+          </a:fontRef>
+        </p:style>
+        <p:txBody>
+          <a:bodyPr rtlCol="0" anchor="ctr"/>
+          <a:lstStyle/>
+          <a:p>
+            <a:pPr algn="ctr"/>
+            <a:r>
+              <a:rPr lang="en-US" dirty="0">
+                <a:solidFill>
+                  <a:schemeClr val="tx1"/>
+                </a:solidFill>
+              </a:rPr>
+              <a:t>h</a:t>
+            </a:r>
+            <a:r>
+              <a:rPr lang="en-US" baseline="-25000" dirty="0">
+                <a:solidFill>
+                  <a:schemeClr val="tx1"/>
+                </a:solidFill>
+              </a:rPr>
+              <a:t>2</a:t>
+            </a:r>
+          </a:p>
+        </p:txBody>
+      </p:sp>
+      <p:sp>
+        <p:nvSpPr>
+          <p:cNvPr id="174" name="Oval 173">
+            <a:extLst>
+              <a:ext uri="{FF2B5EF4-FFF2-40B4-BE49-F238E27FC236}">
+                <a16:creationId xmlns:a16="http://schemas.microsoft.com/office/drawing/2014/main" id="{6E920D52-DE83-4D0D-8AA1-CE3E202120D3}"/>
+              </a:ext>
+            </a:extLst>
+          </p:cNvPr>
+          <p:cNvSpPr/>
+          <p:nvPr/>
+        </p:nvSpPr>
+        <p:spPr>
+          <a:xfrm>
+            <a:off x="2584094" y="5878897"/>
+            <a:ext cx="547688" cy="485775"/>
+          </a:xfrm>
+          <a:prstGeom prst="ellipse">
+            <a:avLst/>
+          </a:prstGeom>
+          <a:noFill/>
+        </p:spPr>
+        <p:style>
+          <a:lnRef idx="2">
+            <a:schemeClr val="accent1">
+              <a:shade val="50000"/>
+            </a:schemeClr>
+          </a:lnRef>
+          <a:fillRef idx="1">
+            <a:schemeClr val="accent1"/>
+          </a:fillRef>
+          <a:effectRef idx="0">
+            <a:schemeClr val="accent1"/>
+          </a:effectRef>
+          <a:fontRef idx="minor">
+            <a:schemeClr val="lt1"/>
+          </a:fontRef>
+        </p:style>
+        <p:txBody>
+          <a:bodyPr rtlCol="0" anchor="ctr"/>
+          <a:lstStyle/>
+          <a:p>
+            <a:pPr algn="ctr"/>
+            <a:r>
+              <a:rPr lang="en-US" dirty="0">
+                <a:solidFill>
+                  <a:schemeClr val="tx1"/>
+                </a:solidFill>
+              </a:rPr>
+              <a:t>i</a:t>
+            </a:r>
+            <a:r>
+              <a:rPr lang="en-US" baseline="-25000" dirty="0">
+                <a:solidFill>
+                  <a:schemeClr val="tx1"/>
+                </a:solidFill>
+              </a:rPr>
+              <a:t>1</a:t>
+            </a:r>
+          </a:p>
+        </p:txBody>
+      </p:sp>
+      <p:sp>
+        <p:nvSpPr>
+          <p:cNvPr id="175" name="Oval 174">
+            <a:extLst>
+              <a:ext uri="{FF2B5EF4-FFF2-40B4-BE49-F238E27FC236}">
+                <a16:creationId xmlns:a16="http://schemas.microsoft.com/office/drawing/2014/main" id="{E52C73DC-FA51-4524-9D96-18BC76D0E11E}"/>
+              </a:ext>
+            </a:extLst>
+          </p:cNvPr>
+          <p:cNvSpPr/>
+          <p:nvPr/>
+        </p:nvSpPr>
+        <p:spPr>
+          <a:xfrm>
+            <a:off x="3433300" y="5878897"/>
+            <a:ext cx="547688" cy="485775"/>
+          </a:xfrm>
+          <a:prstGeom prst="ellipse">
+            <a:avLst/>
+          </a:prstGeom>
+          <a:noFill/>
+        </p:spPr>
+        <p:style>
+          <a:lnRef idx="2">
+            <a:schemeClr val="accent1">
+              <a:shade val="50000"/>
+            </a:schemeClr>
+          </a:lnRef>
+          <a:fillRef idx="1">
+            <a:schemeClr val="accent1"/>
+          </a:fillRef>
+          <a:effectRef idx="0">
+            <a:schemeClr val="accent1"/>
+          </a:effectRef>
+          <a:fontRef idx="minor">
+            <a:schemeClr val="lt1"/>
+          </a:fontRef>
+        </p:style>
+        <p:txBody>
+          <a:bodyPr rtlCol="0" anchor="ctr"/>
+          <a:lstStyle/>
+          <a:p>
+            <a:pPr algn="ctr"/>
+            <a:r>
+              <a:rPr lang="en-US" dirty="0">
+                <a:solidFill>
+                  <a:schemeClr val="tx1"/>
+                </a:solidFill>
+              </a:rPr>
+              <a:t>i</a:t>
+            </a:r>
+            <a:r>
+              <a:rPr lang="en-US" baseline="-25000" dirty="0">
+                <a:solidFill>
+                  <a:schemeClr val="tx1"/>
+                </a:solidFill>
+              </a:rPr>
+              <a:t>2</a:t>
+            </a:r>
+          </a:p>
+        </p:txBody>
+      </p:sp>
+      <p:cxnSp>
+        <p:nvCxnSpPr>
+          <p:cNvPr id="176" name="Straight Arrow Connector 175">
+            <a:extLst>
+              <a:ext uri="{FF2B5EF4-FFF2-40B4-BE49-F238E27FC236}">
+                <a16:creationId xmlns:a16="http://schemas.microsoft.com/office/drawing/2014/main" id="{A9E57AB7-5C99-4A07-AAA8-321A2BC982A2}"/>
+              </a:ext>
+            </a:extLst>
+          </p:cNvPr>
+          <p:cNvCxnSpPr>
+            <a:cxnSpLocks/>
+            <a:stCxn id="172" idx="7"/>
+            <a:endCxn id="171" idx="2"/>
+          </p:cNvCxnSpPr>
+          <p:nvPr/>
+        </p:nvCxnSpPr>
+        <p:spPr>
+          <a:xfrm flipV="1">
+            <a:off x="2534692" y="4952591"/>
+            <a:ext cx="516883" cy="367339"/>
+          </a:xfrm>
+          <a:prstGeom prst="straightConnector1">
+            <a:avLst/>
+          </a:prstGeom>
+          <a:ln w="19050">
+            <a:solidFill>
+              <a:schemeClr val="accent1"/>
+            </a:solidFill>
+            <a:tailEnd type="triangle"/>
+          </a:ln>
+        </p:spPr>
+        <p:style>
+          <a:lnRef idx="1">
+            <a:schemeClr val="accent1"/>
+          </a:lnRef>
+          <a:fillRef idx="0">
+            <a:schemeClr val="accent1"/>
+          </a:fillRef>
+          <a:effectRef idx="0">
+            <a:schemeClr val="accent1"/>
+          </a:effectRef>
+          <a:fontRef idx="minor">
+            <a:schemeClr val="tx1"/>
+          </a:fontRef>
+        </p:style>
+      </p:cxnSp>
+      <p:cxnSp>
+        <p:nvCxnSpPr>
+          <p:cNvPr id="177" name="Straight Arrow Connector 176">
+            <a:extLst>
+              <a:ext uri="{FF2B5EF4-FFF2-40B4-BE49-F238E27FC236}">
+                <a16:creationId xmlns:a16="http://schemas.microsoft.com/office/drawing/2014/main" id="{610CC66A-D326-45E4-8CA8-2608E01C2F8E}"/>
+              </a:ext>
+            </a:extLst>
+          </p:cNvPr>
+          <p:cNvCxnSpPr>
+            <a:cxnSpLocks/>
+            <a:stCxn id="173" idx="1"/>
+            <a:endCxn id="171" idx="3"/>
+          </p:cNvCxnSpPr>
+          <p:nvPr/>
+        </p:nvCxnSpPr>
+        <p:spPr>
+          <a:xfrm flipV="1">
+            <a:off x="2773526" y="5099082"/>
+            <a:ext cx="345496" cy="221985"/>
+          </a:xfrm>
+          <a:prstGeom prst="straightConnector1">
+            <a:avLst/>
+          </a:prstGeom>
+          <a:ln w="19050">
+            <a:solidFill>
+              <a:schemeClr val="accent1"/>
+            </a:solidFill>
+            <a:tailEnd type="triangle"/>
+          </a:ln>
+        </p:spPr>
+        <p:style>
+          <a:lnRef idx="1">
+            <a:schemeClr val="accent1"/>
+          </a:lnRef>
+          <a:fillRef idx="0">
+            <a:schemeClr val="accent1"/>
+          </a:fillRef>
+          <a:effectRef idx="0">
+            <a:schemeClr val="accent1"/>
+          </a:effectRef>
+          <a:fontRef idx="minor">
+            <a:schemeClr val="tx1"/>
+          </a:fontRef>
+        </p:style>
+      </p:cxnSp>
+      <p:cxnSp>
+        <p:nvCxnSpPr>
+          <p:cNvPr id="178" name="Straight Arrow Connector 177">
+            <a:extLst>
+              <a:ext uri="{FF2B5EF4-FFF2-40B4-BE49-F238E27FC236}">
+                <a16:creationId xmlns:a16="http://schemas.microsoft.com/office/drawing/2014/main" id="{DFB92CC6-3DD5-4D27-8DC1-42B3AC15A48C}"/>
+              </a:ext>
+            </a:extLst>
+          </p:cNvPr>
+          <p:cNvCxnSpPr>
+            <a:cxnSpLocks/>
+            <a:stCxn id="174" idx="0"/>
+            <a:endCxn id="172" idx="4"/>
+          </p:cNvCxnSpPr>
+          <p:nvPr/>
+        </p:nvCxnSpPr>
+        <p:spPr>
+          <a:xfrm flipH="1" flipV="1">
+            <a:off x="2341055" y="5734565"/>
+            <a:ext cx="516883" cy="144332"/>
+          </a:xfrm>
+          <a:prstGeom prst="straightConnector1">
+            <a:avLst/>
+          </a:prstGeom>
+          <a:ln w="19050">
+            <a:solidFill>
+              <a:schemeClr val="accent1"/>
+            </a:solidFill>
+            <a:tailEnd type="triangle"/>
+          </a:ln>
+        </p:spPr>
+        <p:style>
+          <a:lnRef idx="1">
+            <a:schemeClr val="accent1"/>
+          </a:lnRef>
+          <a:fillRef idx="0">
+            <a:schemeClr val="accent1"/>
+          </a:fillRef>
+          <a:effectRef idx="0">
+            <a:schemeClr val="accent1"/>
+          </a:effectRef>
+          <a:fontRef idx="minor">
+            <a:schemeClr val="tx1"/>
+          </a:fontRef>
+        </p:style>
+      </p:cxnSp>
+      <p:cxnSp>
+        <p:nvCxnSpPr>
+          <p:cNvPr id="179" name="Straight Arrow Connector 178">
+            <a:extLst>
+              <a:ext uri="{FF2B5EF4-FFF2-40B4-BE49-F238E27FC236}">
+                <a16:creationId xmlns:a16="http://schemas.microsoft.com/office/drawing/2014/main" id="{23B92878-7BD7-4133-A408-4F724C5B986B}"/>
+              </a:ext>
+            </a:extLst>
+          </p:cNvPr>
+          <p:cNvCxnSpPr>
+            <a:cxnSpLocks/>
+            <a:stCxn id="175" idx="0"/>
+            <a:endCxn id="173" idx="4"/>
+          </p:cNvCxnSpPr>
+          <p:nvPr/>
+        </p:nvCxnSpPr>
+        <p:spPr>
+          <a:xfrm flipH="1" flipV="1">
+            <a:off x="2967163" y="5735702"/>
+            <a:ext cx="739981" cy="143195"/>
+          </a:xfrm>
+          <a:prstGeom prst="straightConnector1">
+            <a:avLst/>
+          </a:prstGeom>
+          <a:ln w="19050">
+            <a:solidFill>
+              <a:schemeClr val="accent1"/>
+            </a:solidFill>
+            <a:tailEnd type="triangle"/>
+          </a:ln>
+        </p:spPr>
+        <p:style>
+          <a:lnRef idx="1">
+            <a:schemeClr val="accent1"/>
+          </a:lnRef>
+          <a:fillRef idx="0">
+            <a:schemeClr val="accent1"/>
+          </a:fillRef>
+          <a:effectRef idx="0">
+            <a:schemeClr val="accent1"/>
+          </a:effectRef>
+          <a:fontRef idx="minor">
+            <a:schemeClr val="tx1"/>
+          </a:fontRef>
+        </p:style>
+      </p:cxnSp>
+      <p:cxnSp>
+        <p:nvCxnSpPr>
+          <p:cNvPr id="180" name="Straight Arrow Connector 179">
+            <a:extLst>
+              <a:ext uri="{FF2B5EF4-FFF2-40B4-BE49-F238E27FC236}">
+                <a16:creationId xmlns:a16="http://schemas.microsoft.com/office/drawing/2014/main" id="{B6D747CD-0879-484E-A4E9-B3FCE531BD2C}"/>
+              </a:ext>
+            </a:extLst>
+          </p:cNvPr>
+          <p:cNvCxnSpPr>
+            <a:cxnSpLocks/>
+            <a:stCxn id="175" idx="1"/>
+            <a:endCxn id="172" idx="5"/>
+          </p:cNvCxnSpPr>
+          <p:nvPr/>
+        </p:nvCxnSpPr>
+        <p:spPr>
+          <a:xfrm flipH="1" flipV="1">
+            <a:off x="2534692" y="5663425"/>
+            <a:ext cx="978815" cy="286612"/>
+          </a:xfrm>
+          <a:prstGeom prst="straightConnector1">
+            <a:avLst/>
+          </a:prstGeom>
+          <a:ln w="19050">
+            <a:solidFill>
+              <a:schemeClr val="accent1"/>
+            </a:solidFill>
+            <a:tailEnd type="triangle"/>
+          </a:ln>
+        </p:spPr>
+        <p:style>
+          <a:lnRef idx="1">
+            <a:schemeClr val="accent1"/>
+          </a:lnRef>
+          <a:fillRef idx="0">
+            <a:schemeClr val="accent1"/>
+          </a:fillRef>
+          <a:effectRef idx="0">
+            <a:schemeClr val="accent1"/>
+          </a:effectRef>
+          <a:fontRef idx="minor">
+            <a:schemeClr val="tx1"/>
+          </a:fontRef>
+        </p:style>
+      </p:cxnSp>
+      <p:cxnSp>
+        <p:nvCxnSpPr>
+          <p:cNvPr id="181" name="Straight Arrow Connector 180">
+            <a:extLst>
+              <a:ext uri="{FF2B5EF4-FFF2-40B4-BE49-F238E27FC236}">
+                <a16:creationId xmlns:a16="http://schemas.microsoft.com/office/drawing/2014/main" id="{65335677-F082-4286-9A36-67D6198EB347}"/>
+              </a:ext>
+            </a:extLst>
+          </p:cNvPr>
+          <p:cNvCxnSpPr>
+            <a:cxnSpLocks/>
+            <a:endCxn id="173" idx="3"/>
+          </p:cNvCxnSpPr>
+          <p:nvPr/>
+        </p:nvCxnSpPr>
+        <p:spPr>
+          <a:xfrm flipH="1" flipV="1">
+            <a:off x="2773526" y="5664562"/>
+            <a:ext cx="230966" cy="275928"/>
+          </a:xfrm>
+          <a:prstGeom prst="straightConnector1">
+            <a:avLst/>
+          </a:prstGeom>
+          <a:ln w="19050">
+            <a:solidFill>
+              <a:schemeClr val="accent1"/>
+            </a:solidFill>
+            <a:tailEnd type="triangle"/>
+          </a:ln>
+        </p:spPr>
+        <p:style>
+          <a:lnRef idx="1">
+            <a:schemeClr val="accent1"/>
+          </a:lnRef>
+          <a:fillRef idx="0">
+            <a:schemeClr val="accent1"/>
+          </a:fillRef>
+          <a:effectRef idx="0">
+            <a:schemeClr val="accent1"/>
+          </a:effectRef>
+          <a:fontRef idx="minor">
+            <a:schemeClr val="tx1"/>
+          </a:fontRef>
+        </p:style>
+      </p:cxnSp>
+      <p:sp>
+        <p:nvSpPr>
+          <p:cNvPr id="184" name="Oval 183">
+            <a:extLst>
+              <a:ext uri="{FF2B5EF4-FFF2-40B4-BE49-F238E27FC236}">
+                <a16:creationId xmlns:a16="http://schemas.microsoft.com/office/drawing/2014/main" id="{D68B7853-7A8C-47DF-8852-4D6F8405ED1C}"/>
+              </a:ext>
+            </a:extLst>
+          </p:cNvPr>
+          <p:cNvSpPr/>
+          <p:nvPr/>
+        </p:nvSpPr>
+        <p:spPr>
+          <a:xfrm>
+            <a:off x="4001711" y="5263916"/>
+            <a:ext cx="547688" cy="485775"/>
+          </a:xfrm>
+          <a:prstGeom prst="ellipse">
+            <a:avLst/>
+          </a:prstGeom>
+          <a:noFill/>
+        </p:spPr>
+        <p:style>
+          <a:lnRef idx="2">
+            <a:schemeClr val="accent1">
+              <a:shade val="50000"/>
+            </a:schemeClr>
+          </a:lnRef>
+          <a:fillRef idx="1">
+            <a:schemeClr val="accent1"/>
+          </a:fillRef>
+          <a:effectRef idx="0">
+            <a:schemeClr val="accent1"/>
+          </a:effectRef>
+          <a:fontRef idx="minor">
+            <a:schemeClr val="lt1"/>
+          </a:fontRef>
+        </p:style>
+        <p:txBody>
+          <a:bodyPr rtlCol="0" anchor="ctr"/>
+          <a:lstStyle/>
+          <a:p>
+            <a:pPr algn="ctr"/>
+            <a:r>
+              <a:rPr lang="en-US" dirty="0">
+                <a:solidFill>
+                  <a:schemeClr val="tx1"/>
+                </a:solidFill>
+              </a:rPr>
+              <a:t>h</a:t>
+            </a:r>
+            <a:r>
+              <a:rPr lang="en-US" baseline="-25000" dirty="0">
+                <a:solidFill>
+                  <a:schemeClr val="tx1"/>
+                </a:solidFill>
+              </a:rPr>
+              <a:t>4</a:t>
+            </a:r>
+          </a:p>
+        </p:txBody>
+      </p:sp>
+      <p:cxnSp>
+        <p:nvCxnSpPr>
+          <p:cNvPr id="188" name="Straight Arrow Connector 187">
+            <a:extLst>
+              <a:ext uri="{FF2B5EF4-FFF2-40B4-BE49-F238E27FC236}">
+                <a16:creationId xmlns:a16="http://schemas.microsoft.com/office/drawing/2014/main" id="{F0FE7195-473E-4318-977B-B9B64B825AD7}"/>
+              </a:ext>
+            </a:extLst>
+          </p:cNvPr>
+          <p:cNvCxnSpPr>
+            <a:cxnSpLocks/>
+          </p:cNvCxnSpPr>
+          <p:nvPr/>
+        </p:nvCxnSpPr>
+        <p:spPr>
+          <a:xfrm flipH="1" flipV="1">
+            <a:off x="3496971" y="5008081"/>
+            <a:ext cx="569784" cy="382465"/>
+          </a:xfrm>
+          <a:prstGeom prst="straightConnector1">
+            <a:avLst/>
+          </a:prstGeom>
+          <a:ln w="19050">
+            <a:solidFill>
+              <a:schemeClr val="accent1"/>
+            </a:solidFill>
+            <a:tailEnd type="triangle"/>
+          </a:ln>
+        </p:spPr>
+        <p:style>
+          <a:lnRef idx="1">
+            <a:schemeClr val="accent1"/>
+          </a:lnRef>
+          <a:fillRef idx="0">
+            <a:schemeClr val="accent1"/>
+          </a:fillRef>
+          <a:effectRef idx="0">
+            <a:schemeClr val="accent1"/>
+          </a:effectRef>
+          <a:fontRef idx="minor">
+            <a:schemeClr val="tx1"/>
+          </a:fontRef>
+        </p:style>
+      </p:cxnSp>
+      <p:cxnSp>
+        <p:nvCxnSpPr>
+          <p:cNvPr id="190" name="Straight Arrow Connector 189">
+            <a:extLst>
+              <a:ext uri="{FF2B5EF4-FFF2-40B4-BE49-F238E27FC236}">
+                <a16:creationId xmlns:a16="http://schemas.microsoft.com/office/drawing/2014/main" id="{AA678133-B75D-421D-90C7-B1DE0A4A4D67}"/>
+              </a:ext>
+            </a:extLst>
+          </p:cNvPr>
+          <p:cNvCxnSpPr>
+            <a:cxnSpLocks/>
+            <a:stCxn id="175" idx="7"/>
+            <a:endCxn id="184" idx="4"/>
+          </p:cNvCxnSpPr>
+          <p:nvPr/>
+        </p:nvCxnSpPr>
+        <p:spPr>
+          <a:xfrm flipV="1">
+            <a:off x="3900781" y="5749691"/>
+            <a:ext cx="374774" cy="200346"/>
+          </a:xfrm>
+          <a:prstGeom prst="straightConnector1">
+            <a:avLst/>
+          </a:prstGeom>
+          <a:ln w="19050">
+            <a:solidFill>
+              <a:schemeClr val="accent1"/>
+            </a:solidFill>
+            <a:tailEnd type="triangle"/>
+          </a:ln>
+        </p:spPr>
+        <p:style>
+          <a:lnRef idx="1">
+            <a:schemeClr val="accent1"/>
+          </a:lnRef>
+          <a:fillRef idx="0">
+            <a:schemeClr val="accent1"/>
+          </a:fillRef>
+          <a:effectRef idx="0">
+            <a:schemeClr val="accent1"/>
+          </a:effectRef>
+          <a:fontRef idx="minor">
+            <a:schemeClr val="tx1"/>
+          </a:fontRef>
+        </p:style>
+      </p:cxnSp>
+      <p:cxnSp>
+        <p:nvCxnSpPr>
+          <p:cNvPr id="192" name="Straight Arrow Connector 191">
+            <a:extLst>
+              <a:ext uri="{FF2B5EF4-FFF2-40B4-BE49-F238E27FC236}">
+                <a16:creationId xmlns:a16="http://schemas.microsoft.com/office/drawing/2014/main" id="{5EDC9EDB-D455-48DC-AE59-9BD90C83B821}"/>
+              </a:ext>
+            </a:extLst>
+          </p:cNvPr>
+          <p:cNvCxnSpPr>
+            <a:cxnSpLocks/>
+            <a:stCxn id="174" idx="7"/>
+            <a:endCxn id="184" idx="3"/>
+          </p:cNvCxnSpPr>
+          <p:nvPr/>
+        </p:nvCxnSpPr>
+        <p:spPr>
+          <a:xfrm flipV="1">
+            <a:off x="3051575" y="5678551"/>
+            <a:ext cx="1030343" cy="271486"/>
+          </a:xfrm>
+          <a:prstGeom prst="straightConnector1">
+            <a:avLst/>
+          </a:prstGeom>
+          <a:ln w="19050">
+            <a:solidFill>
+              <a:schemeClr val="accent1"/>
+            </a:solidFill>
+            <a:tailEnd type="triangle"/>
+          </a:ln>
+        </p:spPr>
+        <p:style>
+          <a:lnRef idx="1">
+            <a:schemeClr val="accent1"/>
+          </a:lnRef>
+          <a:fillRef idx="0">
+            <a:schemeClr val="accent1"/>
+          </a:fillRef>
+          <a:effectRef idx="0">
+            <a:schemeClr val="accent1"/>
+          </a:effectRef>
+          <a:fontRef idx="minor">
+            <a:schemeClr val="tx1"/>
+          </a:fontRef>
+        </p:style>
+      </p:cxnSp>
+      <p:sp>
+        <p:nvSpPr>
+          <p:cNvPr id="202" name="Oval 201">
+            <a:extLst>
+              <a:ext uri="{FF2B5EF4-FFF2-40B4-BE49-F238E27FC236}">
+                <a16:creationId xmlns:a16="http://schemas.microsoft.com/office/drawing/2014/main" id="{D2C2BB46-CD62-40CA-A9BE-F829E557FA65}"/>
+              </a:ext>
+            </a:extLst>
+          </p:cNvPr>
+          <p:cNvSpPr/>
+          <p:nvPr/>
+        </p:nvSpPr>
+        <p:spPr>
+          <a:xfrm>
+            <a:off x="5827393" y="4834643"/>
+            <a:ext cx="460559" cy="414338"/>
+          </a:xfrm>
+          <a:prstGeom prst="ellipse">
+            <a:avLst/>
+          </a:prstGeom>
+          <a:noFill/>
+        </p:spPr>
+        <p:style>
+          <a:lnRef idx="2">
+            <a:schemeClr val="accent1">
+              <a:shade val="50000"/>
+            </a:schemeClr>
+          </a:lnRef>
+          <a:fillRef idx="1">
+            <a:schemeClr val="accent1"/>
+          </a:fillRef>
+          <a:effectRef idx="0">
+            <a:schemeClr val="accent1"/>
+          </a:effectRef>
+          <a:fontRef idx="minor">
+            <a:schemeClr val="lt1"/>
+          </a:fontRef>
+        </p:style>
+        <p:txBody>
+          <a:bodyPr rtlCol="0" anchor="ctr"/>
+          <a:lstStyle/>
+          <a:p>
+            <a:pPr algn="ctr"/>
+            <a:r>
+              <a:rPr lang="en-US" dirty="0">
+                <a:solidFill>
+                  <a:schemeClr val="tx1"/>
+                </a:solidFill>
+              </a:rPr>
+              <a:t>O</a:t>
+            </a:r>
+          </a:p>
+        </p:txBody>
+      </p:sp>
+      <p:sp>
+        <p:nvSpPr>
+          <p:cNvPr id="206" name="Oval 205">
+            <a:extLst>
+              <a:ext uri="{FF2B5EF4-FFF2-40B4-BE49-F238E27FC236}">
+                <a16:creationId xmlns:a16="http://schemas.microsoft.com/office/drawing/2014/main" id="{56C562C0-A70D-4FBF-81FD-74425660935A}"/>
+              </a:ext>
+            </a:extLst>
+          </p:cNvPr>
+          <p:cNvSpPr/>
+          <p:nvPr/>
+        </p:nvSpPr>
+        <p:spPr>
+          <a:xfrm>
+            <a:off x="4696728" y="5280892"/>
+            <a:ext cx="547688" cy="485775"/>
+          </a:xfrm>
+          <a:prstGeom prst="ellipse">
+            <a:avLst/>
+          </a:prstGeom>
+          <a:noFill/>
+        </p:spPr>
+        <p:style>
+          <a:lnRef idx="2">
+            <a:schemeClr val="accent1">
+              <a:shade val="50000"/>
+            </a:schemeClr>
+          </a:lnRef>
+          <a:fillRef idx="1">
+            <a:schemeClr val="accent1"/>
+          </a:fillRef>
+          <a:effectRef idx="0">
+            <a:schemeClr val="accent1"/>
+          </a:effectRef>
+          <a:fontRef idx="minor">
+            <a:schemeClr val="lt1"/>
+          </a:fontRef>
+        </p:style>
+        <p:txBody>
+          <a:bodyPr rtlCol="0" anchor="ctr"/>
+          <a:lstStyle/>
+          <a:p>
+            <a:pPr algn="ctr"/>
+            <a:r>
+              <a:rPr lang="en-US" dirty="0">
+                <a:solidFill>
+                  <a:schemeClr val="tx1"/>
+                </a:solidFill>
+              </a:rPr>
+              <a:t>h</a:t>
+            </a:r>
+            <a:r>
+              <a:rPr lang="en-US" baseline="-25000" dirty="0">
+                <a:solidFill>
+                  <a:schemeClr val="tx1"/>
+                </a:solidFill>
+              </a:rPr>
+              <a:t>1</a:t>
+            </a:r>
+          </a:p>
+        </p:txBody>
+      </p:sp>
+      <p:sp>
+        <p:nvSpPr>
+          <p:cNvPr id="208" name="Oval 207">
+            <a:extLst>
+              <a:ext uri="{FF2B5EF4-FFF2-40B4-BE49-F238E27FC236}">
+                <a16:creationId xmlns:a16="http://schemas.microsoft.com/office/drawing/2014/main" id="{462773D4-A7E7-4CEB-A25A-C0A5E2C06ED4}"/>
+              </a:ext>
+            </a:extLst>
+          </p:cNvPr>
+          <p:cNvSpPr/>
+          <p:nvPr/>
+        </p:nvSpPr>
+        <p:spPr>
+          <a:xfrm>
+            <a:off x="5322836" y="5282029"/>
+            <a:ext cx="547688" cy="485775"/>
+          </a:xfrm>
+          <a:prstGeom prst="ellipse">
+            <a:avLst/>
+          </a:prstGeom>
+          <a:noFill/>
+        </p:spPr>
+        <p:style>
+          <a:lnRef idx="2">
+            <a:schemeClr val="accent1">
+              <a:shade val="50000"/>
+            </a:schemeClr>
+          </a:lnRef>
+          <a:fillRef idx="1">
+            <a:schemeClr val="accent1"/>
+          </a:fillRef>
+          <a:effectRef idx="0">
+            <a:schemeClr val="accent1"/>
+          </a:effectRef>
+          <a:fontRef idx="minor">
+            <a:schemeClr val="lt1"/>
+          </a:fontRef>
+        </p:style>
+        <p:txBody>
+          <a:bodyPr rtlCol="0" anchor="ctr"/>
+          <a:lstStyle/>
+          <a:p>
+            <a:pPr algn="ctr"/>
+            <a:r>
+              <a:rPr lang="en-US" dirty="0">
+                <a:solidFill>
+                  <a:schemeClr val="tx1"/>
+                </a:solidFill>
+              </a:rPr>
+              <a:t>h</a:t>
+            </a:r>
+            <a:r>
+              <a:rPr lang="en-US" baseline="-25000" dirty="0">
+                <a:solidFill>
+                  <a:schemeClr val="tx1"/>
+                </a:solidFill>
+              </a:rPr>
+              <a:t>2</a:t>
+            </a:r>
+          </a:p>
+        </p:txBody>
+      </p:sp>
+      <p:sp>
+        <p:nvSpPr>
+          <p:cNvPr id="210" name="Oval 209">
+            <a:extLst>
+              <a:ext uri="{FF2B5EF4-FFF2-40B4-BE49-F238E27FC236}">
+                <a16:creationId xmlns:a16="http://schemas.microsoft.com/office/drawing/2014/main" id="{88BA684B-3CA6-479B-BAB0-943FBB6D5169}"/>
+              </a:ext>
+            </a:extLst>
+          </p:cNvPr>
+          <p:cNvSpPr/>
+          <p:nvPr/>
+        </p:nvSpPr>
+        <p:spPr>
+          <a:xfrm>
+            <a:off x="5213611" y="5910999"/>
+            <a:ext cx="547688" cy="485775"/>
+          </a:xfrm>
+          <a:prstGeom prst="ellipse">
+            <a:avLst/>
+          </a:prstGeom>
+          <a:noFill/>
+        </p:spPr>
+        <p:style>
+          <a:lnRef idx="2">
+            <a:schemeClr val="accent1">
+              <a:shade val="50000"/>
+            </a:schemeClr>
+          </a:lnRef>
+          <a:fillRef idx="1">
+            <a:schemeClr val="accent1"/>
+          </a:fillRef>
+          <a:effectRef idx="0">
+            <a:schemeClr val="accent1"/>
+          </a:effectRef>
+          <a:fontRef idx="minor">
+            <a:schemeClr val="lt1"/>
+          </a:fontRef>
+        </p:style>
+        <p:txBody>
+          <a:bodyPr rtlCol="0" anchor="ctr"/>
+          <a:lstStyle/>
+          <a:p>
+            <a:pPr algn="ctr"/>
+            <a:r>
+              <a:rPr lang="en-US" dirty="0">
+                <a:solidFill>
+                  <a:schemeClr val="tx1"/>
+                </a:solidFill>
+              </a:rPr>
+              <a:t>i</a:t>
+            </a:r>
+            <a:r>
+              <a:rPr lang="en-US" baseline="-25000" dirty="0">
+                <a:solidFill>
+                  <a:schemeClr val="tx1"/>
+                </a:solidFill>
+              </a:rPr>
+              <a:t>1</a:t>
+            </a:r>
+          </a:p>
+        </p:txBody>
+      </p:sp>
+      <p:sp>
+        <p:nvSpPr>
+          <p:cNvPr id="212" name="Oval 211">
+            <a:extLst>
+              <a:ext uri="{FF2B5EF4-FFF2-40B4-BE49-F238E27FC236}">
+                <a16:creationId xmlns:a16="http://schemas.microsoft.com/office/drawing/2014/main" id="{404C1332-885D-4CC5-A8BF-78BDA9765926}"/>
+              </a:ext>
+            </a:extLst>
+          </p:cNvPr>
+          <p:cNvSpPr/>
+          <p:nvPr/>
+        </p:nvSpPr>
+        <p:spPr>
+          <a:xfrm>
+            <a:off x="6062817" y="5910999"/>
+            <a:ext cx="547688" cy="485775"/>
+          </a:xfrm>
+          <a:prstGeom prst="ellipse">
+            <a:avLst/>
+          </a:prstGeom>
+          <a:noFill/>
+        </p:spPr>
+        <p:style>
+          <a:lnRef idx="2">
+            <a:schemeClr val="accent1">
+              <a:shade val="50000"/>
+            </a:schemeClr>
+          </a:lnRef>
+          <a:fillRef idx="1">
+            <a:schemeClr val="accent1"/>
+          </a:fillRef>
+          <a:effectRef idx="0">
+            <a:schemeClr val="accent1"/>
+          </a:effectRef>
+          <a:fontRef idx="minor">
+            <a:schemeClr val="lt1"/>
+          </a:fontRef>
+        </p:style>
+        <p:txBody>
+          <a:bodyPr rtlCol="0" anchor="ctr"/>
+          <a:lstStyle/>
+          <a:p>
+            <a:pPr algn="ctr"/>
+            <a:r>
+              <a:rPr lang="en-US" dirty="0">
+                <a:solidFill>
+                  <a:schemeClr val="tx1"/>
+                </a:solidFill>
+              </a:rPr>
+              <a:t>i</a:t>
+            </a:r>
+            <a:r>
+              <a:rPr lang="en-US" baseline="-25000" dirty="0">
+                <a:solidFill>
+                  <a:schemeClr val="tx1"/>
+                </a:solidFill>
+              </a:rPr>
+              <a:t>2</a:t>
+            </a:r>
+          </a:p>
+        </p:txBody>
+      </p:sp>
+      <p:cxnSp>
+        <p:nvCxnSpPr>
+          <p:cNvPr id="214" name="Straight Arrow Connector 213">
+            <a:extLst>
+              <a:ext uri="{FF2B5EF4-FFF2-40B4-BE49-F238E27FC236}">
+                <a16:creationId xmlns:a16="http://schemas.microsoft.com/office/drawing/2014/main" id="{E3C78B02-22AE-4AFC-847F-573E7C02BC45}"/>
+              </a:ext>
+            </a:extLst>
+          </p:cNvPr>
+          <p:cNvCxnSpPr>
+            <a:cxnSpLocks/>
+            <a:stCxn id="206" idx="7"/>
+            <a:endCxn id="202" idx="1"/>
+          </p:cNvCxnSpPr>
+          <p:nvPr/>
+        </p:nvCxnSpPr>
+        <p:spPr>
+          <a:xfrm flipV="1">
+            <a:off x="5164209" y="4895321"/>
+            <a:ext cx="730631" cy="456711"/>
+          </a:xfrm>
+          <a:prstGeom prst="straightConnector1">
+            <a:avLst/>
+          </a:prstGeom>
+          <a:ln w="19050">
+            <a:solidFill>
+              <a:schemeClr val="accent1"/>
+            </a:solidFill>
+            <a:tailEnd type="triangle"/>
+          </a:ln>
+        </p:spPr>
+        <p:style>
+          <a:lnRef idx="1">
+            <a:schemeClr val="accent1"/>
+          </a:lnRef>
+          <a:fillRef idx="0">
+            <a:schemeClr val="accent1"/>
+          </a:fillRef>
+          <a:effectRef idx="0">
+            <a:schemeClr val="accent1"/>
+          </a:effectRef>
+          <a:fontRef idx="minor">
+            <a:schemeClr val="tx1"/>
+          </a:fontRef>
+        </p:style>
+      </p:cxnSp>
+      <p:cxnSp>
+        <p:nvCxnSpPr>
+          <p:cNvPr id="216" name="Straight Arrow Connector 215">
+            <a:extLst>
+              <a:ext uri="{FF2B5EF4-FFF2-40B4-BE49-F238E27FC236}">
+                <a16:creationId xmlns:a16="http://schemas.microsoft.com/office/drawing/2014/main" id="{111416B3-8336-4D20-8E04-C9BFD13E159F}"/>
+              </a:ext>
+            </a:extLst>
+          </p:cNvPr>
+          <p:cNvCxnSpPr>
+            <a:cxnSpLocks/>
+            <a:stCxn id="208" idx="7"/>
+            <a:endCxn id="202" idx="3"/>
+          </p:cNvCxnSpPr>
+          <p:nvPr/>
+        </p:nvCxnSpPr>
+        <p:spPr>
+          <a:xfrm flipV="1">
+            <a:off x="5790317" y="5188303"/>
+            <a:ext cx="104523" cy="164866"/>
+          </a:xfrm>
+          <a:prstGeom prst="straightConnector1">
+            <a:avLst/>
+          </a:prstGeom>
+          <a:ln w="19050">
+            <a:solidFill>
+              <a:schemeClr val="accent1"/>
+            </a:solidFill>
+            <a:tailEnd type="triangle"/>
+          </a:ln>
+        </p:spPr>
+        <p:style>
+          <a:lnRef idx="1">
+            <a:schemeClr val="accent1"/>
+          </a:lnRef>
+          <a:fillRef idx="0">
+            <a:schemeClr val="accent1"/>
+          </a:fillRef>
+          <a:effectRef idx="0">
+            <a:schemeClr val="accent1"/>
+          </a:effectRef>
+          <a:fontRef idx="minor">
+            <a:schemeClr val="tx1"/>
+          </a:fontRef>
+        </p:style>
+      </p:cxnSp>
+      <p:cxnSp>
+        <p:nvCxnSpPr>
+          <p:cNvPr id="218" name="Straight Arrow Connector 217">
+            <a:extLst>
+              <a:ext uri="{FF2B5EF4-FFF2-40B4-BE49-F238E27FC236}">
+                <a16:creationId xmlns:a16="http://schemas.microsoft.com/office/drawing/2014/main" id="{D94EA3B6-BC7F-49F2-9C17-2343FA1BDC5B}"/>
+              </a:ext>
+            </a:extLst>
+          </p:cNvPr>
+          <p:cNvCxnSpPr>
+            <a:cxnSpLocks/>
+            <a:stCxn id="210" idx="0"/>
+            <a:endCxn id="206" idx="4"/>
+          </p:cNvCxnSpPr>
+          <p:nvPr/>
+        </p:nvCxnSpPr>
+        <p:spPr>
+          <a:xfrm flipH="1" flipV="1">
+            <a:off x="4970572" y="5766667"/>
+            <a:ext cx="516883" cy="144332"/>
+          </a:xfrm>
+          <a:prstGeom prst="straightConnector1">
+            <a:avLst/>
+          </a:prstGeom>
+          <a:ln w="19050">
+            <a:solidFill>
+              <a:schemeClr val="accent1"/>
+            </a:solidFill>
+            <a:tailEnd type="triangle"/>
+          </a:ln>
+        </p:spPr>
+        <p:style>
+          <a:lnRef idx="1">
+            <a:schemeClr val="accent1"/>
+          </a:lnRef>
+          <a:fillRef idx="0">
+            <a:schemeClr val="accent1"/>
+          </a:fillRef>
+          <a:effectRef idx="0">
+            <a:schemeClr val="accent1"/>
+          </a:effectRef>
+          <a:fontRef idx="minor">
+            <a:schemeClr val="tx1"/>
+          </a:fontRef>
+        </p:style>
+      </p:cxnSp>
+      <p:cxnSp>
+        <p:nvCxnSpPr>
+          <p:cNvPr id="221" name="Straight Arrow Connector 220">
+            <a:extLst>
+              <a:ext uri="{FF2B5EF4-FFF2-40B4-BE49-F238E27FC236}">
+                <a16:creationId xmlns:a16="http://schemas.microsoft.com/office/drawing/2014/main" id="{B2AD7376-B0C2-437C-AB98-A739C0760B0B}"/>
+              </a:ext>
+            </a:extLst>
+          </p:cNvPr>
+          <p:cNvCxnSpPr>
+            <a:cxnSpLocks/>
+            <a:stCxn id="212" idx="0"/>
+            <a:endCxn id="208" idx="4"/>
+          </p:cNvCxnSpPr>
+          <p:nvPr/>
+        </p:nvCxnSpPr>
+        <p:spPr>
+          <a:xfrm flipH="1" flipV="1">
+            <a:off x="5596680" y="5767804"/>
+            <a:ext cx="739981" cy="143195"/>
+          </a:xfrm>
+          <a:prstGeom prst="straightConnector1">
+            <a:avLst/>
+          </a:prstGeom>
+          <a:ln w="19050">
+            <a:solidFill>
+              <a:schemeClr val="accent1"/>
+            </a:solidFill>
+            <a:tailEnd type="triangle"/>
+          </a:ln>
+        </p:spPr>
+        <p:style>
+          <a:lnRef idx="1">
+            <a:schemeClr val="accent1"/>
+          </a:lnRef>
+          <a:fillRef idx="0">
+            <a:schemeClr val="accent1"/>
+          </a:fillRef>
+          <a:effectRef idx="0">
+            <a:schemeClr val="accent1"/>
+          </a:effectRef>
+          <a:fontRef idx="minor">
+            <a:schemeClr val="tx1"/>
+          </a:fontRef>
+        </p:style>
+      </p:cxnSp>
+      <p:cxnSp>
+        <p:nvCxnSpPr>
+          <p:cNvPr id="225" name="Straight Arrow Connector 224">
+            <a:extLst>
+              <a:ext uri="{FF2B5EF4-FFF2-40B4-BE49-F238E27FC236}">
+                <a16:creationId xmlns:a16="http://schemas.microsoft.com/office/drawing/2014/main" id="{6AAE2B86-BE65-482C-BEFF-CB4C3880C0F7}"/>
+              </a:ext>
+            </a:extLst>
+          </p:cNvPr>
+          <p:cNvCxnSpPr>
+            <a:cxnSpLocks/>
+            <a:stCxn id="212" idx="1"/>
+            <a:endCxn id="206" idx="5"/>
+          </p:cNvCxnSpPr>
+          <p:nvPr/>
+        </p:nvCxnSpPr>
+        <p:spPr>
+          <a:xfrm flipH="1" flipV="1">
+            <a:off x="5164209" y="5695527"/>
+            <a:ext cx="978815" cy="286612"/>
+          </a:xfrm>
+          <a:prstGeom prst="straightConnector1">
+            <a:avLst/>
+          </a:prstGeom>
+          <a:ln w="19050">
+            <a:solidFill>
+              <a:schemeClr val="accent1"/>
+            </a:solidFill>
+            <a:tailEnd type="triangle"/>
+          </a:ln>
+        </p:spPr>
+        <p:style>
+          <a:lnRef idx="1">
+            <a:schemeClr val="accent1"/>
+          </a:lnRef>
+          <a:fillRef idx="0">
+            <a:schemeClr val="accent1"/>
+          </a:fillRef>
+          <a:effectRef idx="0">
+            <a:schemeClr val="accent1"/>
+          </a:effectRef>
+          <a:fontRef idx="minor">
+            <a:schemeClr val="tx1"/>
+          </a:fontRef>
+        </p:style>
+      </p:cxnSp>
+      <p:cxnSp>
+        <p:nvCxnSpPr>
+          <p:cNvPr id="227" name="Straight Arrow Connector 226">
+            <a:extLst>
+              <a:ext uri="{FF2B5EF4-FFF2-40B4-BE49-F238E27FC236}">
+                <a16:creationId xmlns:a16="http://schemas.microsoft.com/office/drawing/2014/main" id="{8C9DA451-4FCE-41B7-9843-3DC869022838}"/>
+              </a:ext>
+            </a:extLst>
+          </p:cNvPr>
+          <p:cNvCxnSpPr>
+            <a:cxnSpLocks/>
+            <a:endCxn id="208" idx="3"/>
+          </p:cNvCxnSpPr>
+          <p:nvPr/>
+        </p:nvCxnSpPr>
+        <p:spPr>
+          <a:xfrm flipH="1" flipV="1">
+            <a:off x="5403043" y="5696664"/>
+            <a:ext cx="230966" cy="275928"/>
+          </a:xfrm>
+          <a:prstGeom prst="straightConnector1">
+            <a:avLst/>
+          </a:prstGeom>
+          <a:ln w="19050">
+            <a:solidFill>
+              <a:schemeClr val="accent1"/>
+            </a:solidFill>
+            <a:tailEnd type="triangle"/>
+          </a:ln>
+        </p:spPr>
+        <p:style>
+          <a:lnRef idx="1">
+            <a:schemeClr val="accent1"/>
+          </a:lnRef>
+          <a:fillRef idx="0">
+            <a:schemeClr val="accent1"/>
+          </a:fillRef>
+          <a:effectRef idx="0">
+            <a:schemeClr val="accent1"/>
+          </a:effectRef>
+          <a:fontRef idx="minor">
+            <a:schemeClr val="tx1"/>
+          </a:fontRef>
+        </p:style>
+      </p:cxnSp>
+      <p:sp>
+        <p:nvSpPr>
+          <p:cNvPr id="229" name="Oval 228">
+            <a:extLst>
+              <a:ext uri="{FF2B5EF4-FFF2-40B4-BE49-F238E27FC236}">
+                <a16:creationId xmlns:a16="http://schemas.microsoft.com/office/drawing/2014/main" id="{45F19FB5-D6E8-4B01-85AF-206F07F66BA2}"/>
+              </a:ext>
+            </a:extLst>
+          </p:cNvPr>
+          <p:cNvSpPr/>
+          <p:nvPr/>
+        </p:nvSpPr>
+        <p:spPr>
+          <a:xfrm>
+            <a:off x="5977032" y="5263916"/>
+            <a:ext cx="547688" cy="485775"/>
+          </a:xfrm>
+          <a:prstGeom prst="ellipse">
+            <a:avLst/>
+          </a:prstGeom>
+          <a:noFill/>
+        </p:spPr>
+        <p:style>
+          <a:lnRef idx="2">
+            <a:schemeClr val="accent1">
+              <a:shade val="50000"/>
+            </a:schemeClr>
+          </a:lnRef>
+          <a:fillRef idx="1">
+            <a:schemeClr val="accent1"/>
+          </a:fillRef>
+          <a:effectRef idx="0">
+            <a:schemeClr val="accent1"/>
+          </a:effectRef>
+          <a:fontRef idx="minor">
+            <a:schemeClr val="lt1"/>
+          </a:fontRef>
+        </p:style>
+        <p:txBody>
+          <a:bodyPr rtlCol="0" anchor="ctr"/>
+          <a:lstStyle/>
+          <a:p>
+            <a:pPr algn="ctr"/>
+            <a:r>
+              <a:rPr lang="en-US" dirty="0">
+                <a:solidFill>
+                  <a:schemeClr val="tx1"/>
+                </a:solidFill>
+              </a:rPr>
+              <a:t>h</a:t>
+            </a:r>
+            <a:r>
+              <a:rPr lang="en-US" baseline="-25000" dirty="0">
+                <a:solidFill>
+                  <a:schemeClr val="tx1"/>
+                </a:solidFill>
+              </a:rPr>
+              <a:t>3</a:t>
+            </a:r>
+          </a:p>
+        </p:txBody>
+      </p:sp>
+      <p:cxnSp>
+        <p:nvCxnSpPr>
+          <p:cNvPr id="234" name="Straight Arrow Connector 233">
+            <a:extLst>
+              <a:ext uri="{FF2B5EF4-FFF2-40B4-BE49-F238E27FC236}">
+                <a16:creationId xmlns:a16="http://schemas.microsoft.com/office/drawing/2014/main" id="{783A42DC-B17E-4DC5-B2E3-DA68C13F3036}"/>
+              </a:ext>
+            </a:extLst>
+          </p:cNvPr>
+          <p:cNvCxnSpPr>
+            <a:cxnSpLocks/>
+            <a:endCxn id="202" idx="5"/>
+          </p:cNvCxnSpPr>
+          <p:nvPr/>
+        </p:nvCxnSpPr>
+        <p:spPr>
+          <a:xfrm flipH="1" flipV="1">
+            <a:off x="6220505" y="5188303"/>
+            <a:ext cx="176672" cy="132732"/>
+          </a:xfrm>
+          <a:prstGeom prst="straightConnector1">
+            <a:avLst/>
+          </a:prstGeom>
+          <a:ln w="19050">
+            <a:solidFill>
+              <a:schemeClr val="accent1"/>
+            </a:solidFill>
+            <a:tailEnd type="triangle"/>
+          </a:ln>
+        </p:spPr>
+        <p:style>
+          <a:lnRef idx="1">
+            <a:schemeClr val="accent1"/>
+          </a:lnRef>
+          <a:fillRef idx="0">
+            <a:schemeClr val="accent1"/>
+          </a:fillRef>
+          <a:effectRef idx="0">
+            <a:schemeClr val="accent1"/>
+          </a:effectRef>
+          <a:fontRef idx="minor">
+            <a:schemeClr val="tx1"/>
+          </a:fontRef>
+        </p:style>
+      </p:cxnSp>
+      <p:cxnSp>
+        <p:nvCxnSpPr>
+          <p:cNvPr id="238" name="Straight Arrow Connector 237">
+            <a:extLst>
+              <a:ext uri="{FF2B5EF4-FFF2-40B4-BE49-F238E27FC236}">
+                <a16:creationId xmlns:a16="http://schemas.microsoft.com/office/drawing/2014/main" id="{A93B5D0E-6E51-48A1-AEC2-350523AB61C8}"/>
+              </a:ext>
+            </a:extLst>
+          </p:cNvPr>
+          <p:cNvCxnSpPr>
+            <a:cxnSpLocks/>
+            <a:stCxn id="210" idx="7"/>
+            <a:endCxn id="229" idx="3"/>
+          </p:cNvCxnSpPr>
+          <p:nvPr/>
+        </p:nvCxnSpPr>
+        <p:spPr>
+          <a:xfrm flipV="1">
+            <a:off x="5681092" y="5678551"/>
+            <a:ext cx="376147" cy="303588"/>
+          </a:xfrm>
+          <a:prstGeom prst="straightConnector1">
+            <a:avLst/>
+          </a:prstGeom>
+          <a:ln w="19050">
+            <a:solidFill>
+              <a:schemeClr val="accent1"/>
+            </a:solidFill>
+            <a:tailEnd type="triangle"/>
+          </a:ln>
+        </p:spPr>
+        <p:style>
+          <a:lnRef idx="1">
+            <a:schemeClr val="accent1"/>
+          </a:lnRef>
+          <a:fillRef idx="0">
+            <a:schemeClr val="accent1"/>
+          </a:fillRef>
+          <a:effectRef idx="0">
+            <a:schemeClr val="accent1"/>
+          </a:effectRef>
+          <a:fontRef idx="minor">
+            <a:schemeClr val="tx1"/>
+          </a:fontRef>
+        </p:style>
+      </p:cxnSp>
+      <p:cxnSp>
+        <p:nvCxnSpPr>
+          <p:cNvPr id="245" name="Straight Arrow Connector 244">
+            <a:extLst>
+              <a:ext uri="{FF2B5EF4-FFF2-40B4-BE49-F238E27FC236}">
+                <a16:creationId xmlns:a16="http://schemas.microsoft.com/office/drawing/2014/main" id="{55D03CB9-6A56-4CC8-AF72-F8BCB121AB33}"/>
+              </a:ext>
+            </a:extLst>
+          </p:cNvPr>
+          <p:cNvCxnSpPr>
+            <a:cxnSpLocks/>
+            <a:stCxn id="212" idx="0"/>
+            <a:endCxn id="229" idx="4"/>
+          </p:cNvCxnSpPr>
+          <p:nvPr/>
+        </p:nvCxnSpPr>
+        <p:spPr>
+          <a:xfrm flipH="1" flipV="1">
+            <a:off x="6250876" y="5749691"/>
+            <a:ext cx="85785" cy="161308"/>
+          </a:xfrm>
+          <a:prstGeom prst="straightConnector1">
+            <a:avLst/>
+          </a:prstGeom>
+          <a:ln w="19050">
+            <a:solidFill>
+              <a:schemeClr val="accent1"/>
+            </a:solidFill>
+            <a:tailEnd type="triangle"/>
+          </a:ln>
+        </p:spPr>
+        <p:style>
+          <a:lnRef idx="1">
+            <a:schemeClr val="accent1"/>
+          </a:lnRef>
+          <a:fillRef idx="0">
+            <a:schemeClr val="accent1"/>
+          </a:fillRef>
+          <a:effectRef idx="0">
+            <a:schemeClr val="accent1"/>
+          </a:effectRef>
+          <a:fontRef idx="minor">
+            <a:schemeClr val="tx1"/>
+          </a:fontRef>
+        </p:style>
+      </p:cxnSp>
+    </p:spTree>
+    <p:extLst>
+      <p:ext uri="{BB962C8B-B14F-4D97-AF65-F5344CB8AC3E}">
+        <p14:creationId xmlns:p14="http://schemas.microsoft.com/office/powerpoint/2010/main" val="2850560206"/>
+      </p:ext>
+    </p:extLst>
+  </p:cSld>
+  <p:clrMapOvr>
+    <a:masterClrMapping/>
+  </p:clrMapOvr>
+</p:sld>
+</file>
+
+<file path=ppt/slides/slide4.xml><?xml version="1.0" encoding="utf-8"?>
 <p:sld xmlns:a="http://schemas.openxmlformats.org/drawingml/2006/main" xmlns:r="http://schemas.openxmlformats.org/officeDocument/2006/relationships" xmlns:p="http://schemas.openxmlformats.org/presentationml/2006/main">
   <p:cSld>
     <p:spTree>

</xml_diff>